<commit_message>
update class diagram in powerpoint
</commit_message>
<xml_diff>
--- a/8- Presentation/P1 Presentation.pptx
+++ b/8- Presentation/P1 Presentation.pptx
@@ -842,7 +842,7 @@
           <a:p>
             <a:fld id="{50A20B50-CD93-4409-9A92-1322BC8DCCFF}" type="datetimeFigureOut">
               <a:rPr lang="en-US" smtClean="0"/>
-              <a:t>9/26/2020</a:t>
+              <a:t>9/27/2020</a:t>
             </a:fld>
             <a:endParaRPr lang="en-US"/>
           </a:p>
@@ -1093,7 +1093,7 @@
           <a:p>
             <a:fld id="{50A20B50-CD93-4409-9A92-1322BC8DCCFF}" type="datetimeFigureOut">
               <a:rPr lang="en-US" smtClean="0"/>
-              <a:t>9/26/2020</a:t>
+              <a:t>9/27/2020</a:t>
             </a:fld>
             <a:endParaRPr lang="en-US"/>
           </a:p>
@@ -1407,7 +1407,7 @@
           <a:p>
             <a:fld id="{50A20B50-CD93-4409-9A92-1322BC8DCCFF}" type="datetimeFigureOut">
               <a:rPr lang="en-US" smtClean="0"/>
-              <a:t>9/26/2020</a:t>
+              <a:t>9/27/2020</a:t>
             </a:fld>
             <a:endParaRPr lang="en-US"/>
           </a:p>
@@ -1734,7 +1734,7 @@
           <a:p>
             <a:fld id="{50A20B50-CD93-4409-9A92-1322BC8DCCFF}" type="datetimeFigureOut">
               <a:rPr lang="en-US" smtClean="0"/>
-              <a:t>9/26/2020</a:t>
+              <a:t>9/27/2020</a:t>
             </a:fld>
             <a:endParaRPr lang="en-US"/>
           </a:p>
@@ -2048,7 +2048,7 @@
           <a:p>
             <a:fld id="{50A20B50-CD93-4409-9A92-1322BC8DCCFF}" type="datetimeFigureOut">
               <a:rPr lang="en-US" smtClean="0"/>
-              <a:t>9/26/2020</a:t>
+              <a:t>9/27/2020</a:t>
             </a:fld>
             <a:endParaRPr lang="en-US"/>
           </a:p>
@@ -2435,7 +2435,7 @@
           <a:p>
             <a:fld id="{50A20B50-CD93-4409-9A92-1322BC8DCCFF}" type="datetimeFigureOut">
               <a:rPr lang="en-US" smtClean="0"/>
-              <a:t>9/26/2020</a:t>
+              <a:t>9/27/2020</a:t>
             </a:fld>
             <a:endParaRPr lang="en-US"/>
           </a:p>
@@ -2605,7 +2605,7 @@
           <a:p>
             <a:fld id="{50A20B50-CD93-4409-9A92-1322BC8DCCFF}" type="datetimeFigureOut">
               <a:rPr lang="en-US" smtClean="0"/>
-              <a:t>9/26/2020</a:t>
+              <a:t>9/27/2020</a:t>
             </a:fld>
             <a:endParaRPr lang="en-US"/>
           </a:p>
@@ -2785,7 +2785,7 @@
           <a:p>
             <a:fld id="{50A20B50-CD93-4409-9A92-1322BC8DCCFF}" type="datetimeFigureOut">
               <a:rPr lang="en-US" smtClean="0"/>
-              <a:t>9/26/2020</a:t>
+              <a:t>9/27/2020</a:t>
             </a:fld>
             <a:endParaRPr lang="en-US"/>
           </a:p>
@@ -2961,7 +2961,7 @@
           <a:p>
             <a:fld id="{50A20B50-CD93-4409-9A92-1322BC8DCCFF}" type="datetimeFigureOut">
               <a:rPr lang="en-US" smtClean="0"/>
-              <a:t>9/26/2020</a:t>
+              <a:t>9/27/2020</a:t>
             </a:fld>
             <a:endParaRPr lang="en-US"/>
           </a:p>
@@ -3208,7 +3208,7 @@
           <a:p>
             <a:fld id="{50A20B50-CD93-4409-9A92-1322BC8DCCFF}" type="datetimeFigureOut">
               <a:rPr lang="en-US" smtClean="0"/>
-              <a:t>9/26/2020</a:t>
+              <a:t>9/27/2020</a:t>
             </a:fld>
             <a:endParaRPr lang="en-US"/>
           </a:p>
@@ -3440,7 +3440,7 @@
           <a:p>
             <a:fld id="{50A20B50-CD93-4409-9A92-1322BC8DCCFF}" type="datetimeFigureOut">
               <a:rPr lang="en-US" smtClean="0"/>
-              <a:t>9/26/2020</a:t>
+              <a:t>9/27/2020</a:t>
             </a:fld>
             <a:endParaRPr lang="en-US"/>
           </a:p>
@@ -3814,7 +3814,7 @@
           <a:p>
             <a:fld id="{50A20B50-CD93-4409-9A92-1322BC8DCCFF}" type="datetimeFigureOut">
               <a:rPr lang="en-US" smtClean="0"/>
-              <a:t>9/26/2020</a:t>
+              <a:t>9/27/2020</a:t>
             </a:fld>
             <a:endParaRPr lang="en-US"/>
           </a:p>
@@ -3937,7 +3937,7 @@
           <a:p>
             <a:fld id="{50A20B50-CD93-4409-9A92-1322BC8DCCFF}" type="datetimeFigureOut">
               <a:rPr lang="en-US" smtClean="0"/>
-              <a:t>9/26/2020</a:t>
+              <a:t>9/27/2020</a:t>
             </a:fld>
             <a:endParaRPr lang="en-US"/>
           </a:p>
@@ -4032,7 +4032,7 @@
           <a:p>
             <a:fld id="{50A20B50-CD93-4409-9A92-1322BC8DCCFF}" type="datetimeFigureOut">
               <a:rPr lang="en-US" smtClean="0"/>
-              <a:t>9/26/2020</a:t>
+              <a:t>9/27/2020</a:t>
             </a:fld>
             <a:endParaRPr lang="en-US"/>
           </a:p>
@@ -4287,7 +4287,7 @@
           <a:p>
             <a:fld id="{50A20B50-CD93-4409-9A92-1322BC8DCCFF}" type="datetimeFigureOut">
               <a:rPr lang="en-US" smtClean="0"/>
-              <a:t>9/26/2020</a:t>
+              <a:t>9/27/2020</a:t>
             </a:fld>
             <a:endParaRPr lang="en-US"/>
           </a:p>
@@ -4550,7 +4550,7 @@
           <a:p>
             <a:fld id="{50A20B50-CD93-4409-9A92-1322BC8DCCFF}" type="datetimeFigureOut">
               <a:rPr lang="en-US" smtClean="0"/>
-              <a:t>9/26/2020</a:t>
+              <a:t>9/27/2020</a:t>
             </a:fld>
             <a:endParaRPr lang="en-US"/>
           </a:p>
@@ -5295,7 +5295,7 @@
           <a:p>
             <a:fld id="{50A20B50-CD93-4409-9A92-1322BC8DCCFF}" type="datetimeFigureOut">
               <a:rPr lang="en-US" smtClean="0"/>
-              <a:t>9/26/2020</a:t>
+              <a:t>9/27/2020</a:t>
             </a:fld>
             <a:endParaRPr lang="en-US"/>
           </a:p>
@@ -6325,22 +6325,15 @@
               <a:rPr lang="en-US" dirty="0"/>
               <a:t>Class Diagrams</a:t>
             </a:r>
-            <a:br>
-              <a:rPr lang="en-US" dirty="0"/>
-            </a:br>
-            <a:r>
-              <a:rPr lang="en-US" dirty="0"/>
-              <a:t>(TEMPORARY!!)</a:t>
-            </a:r>
           </a:p>
         </p:txBody>
       </p:sp>
       <p:pic>
         <p:nvPicPr>
-          <p:cNvPr id="5" name="Picture 4" descr="Diagram, schematic&#10;&#10;Description automatically generated">
+          <p:cNvPr id="4" name="Picture 3" descr="Diagram&#10;&#10;Description automatically generated">
             <a:extLst>
               <a:ext uri="{FF2B5EF4-FFF2-40B4-BE49-F238E27FC236}">
-                <a16:creationId xmlns:a16="http://schemas.microsoft.com/office/drawing/2014/main" id="{A7C3146E-E7A4-4574-AAF4-1C363D1DFAE6}"/>
+                <a16:creationId xmlns:a16="http://schemas.microsoft.com/office/drawing/2014/main" id="{57457876-CEBE-48C8-B7F5-BC508819305B}"/>
               </a:ext>
             </a:extLst>
           </p:cNvPr>
@@ -6363,8 +6356,8 @@
         </p:blipFill>
         <p:spPr>
           <a:xfrm>
-            <a:off x="5364822" y="0"/>
-            <a:ext cx="6827178" cy="6858000"/>
+            <a:off x="5797877" y="0"/>
+            <a:ext cx="6394123" cy="6858000"/>
           </a:xfrm>
           <a:prstGeom prst="rect">
             <a:avLst/>

</xml_diff>

<commit_message>
fill scrum ceremonies slide
</commit_message>
<xml_diff>
--- a/8- Presentation/P1 Presentation.pptx
+++ b/8- Presentation/P1 Presentation.pptx
@@ -6536,7 +6536,38 @@
           <a:bodyPr/>
           <a:lstStyle/>
           <a:p>
-            <a:endParaRPr lang="en-US"/>
+            <a:r>
+              <a:rPr lang="en-US" dirty="0"/>
+              <a:t>Scrum ceremonies let us coordinate between ourselves and where we needed to be in the project. Post-scrum time was a reliable time for us all to work and talk together at the same time, instead of asynchronously. </a:t>
+            </a:r>
+          </a:p>
+          <a:p>
+            <a:r>
+              <a:rPr lang="en-US" dirty="0"/>
+              <a:t>Material results included the Sprint documentation in Sprint1.md. </a:t>
+            </a:r>
+          </a:p>
+          <a:p>
+            <a:r>
+              <a:rPr lang="en-US" dirty="0"/>
+              <a:t>The most valuable results were process results, which included concrete listing of tasks in </a:t>
+            </a:r>
+            <a:r>
+              <a:rPr lang="en-US" dirty="0" err="1"/>
+              <a:t>ZenHub</a:t>
+            </a:r>
+            <a:r>
+              <a:rPr lang="en-US" dirty="0"/>
+              <a:t> for us to complete and orientation</a:t>
+            </a:r>
+            <a:r>
+              <a:rPr lang="en-US"/>
+              <a:t>/planning </a:t>
+            </a:r>
+            <a:r>
+              <a:rPr lang="en-US" dirty="0"/>
+              <a:t>to complete those tasks. </a:t>
+            </a:r>
           </a:p>
         </p:txBody>
       </p:sp>

</xml_diff>

<commit_message>
remove java from diagram class names
</commit_message>
<xml_diff>
--- a/8- Presentation/P1 Presentation.pptx
+++ b/8- Presentation/P1 Presentation.pptx
@@ -6330,10 +6330,10 @@
       </p:sp>
       <p:pic>
         <p:nvPicPr>
-          <p:cNvPr id="4" name="Picture 3" descr="Diagram&#10;&#10;Description automatically generated">
+          <p:cNvPr id="5" name="Picture 4" descr="Diagram, schematic&#10;&#10;Description automatically generated">
             <a:extLst>
               <a:ext uri="{FF2B5EF4-FFF2-40B4-BE49-F238E27FC236}">
-                <a16:creationId xmlns:a16="http://schemas.microsoft.com/office/drawing/2014/main" id="{57457876-CEBE-48C8-B7F5-BC508819305B}"/>
+                <a16:creationId xmlns:a16="http://schemas.microsoft.com/office/drawing/2014/main" id="{3291A60D-BAF6-4F5C-A9F2-5F4881EE04BB}"/>
               </a:ext>
             </a:extLst>
           </p:cNvPr>

</xml_diff>

<commit_message>
Add Final P1 Presentation
</commit_message>
<xml_diff>
--- a/8- Presentation/P1 Presentation.pptx
+++ b/8- Presentation/P1 Presentation.pptx
@@ -2,16 +2,22 @@
 <file path=ppt/presentation.xml><?xml version="1.0" encoding="utf-8"?>
 <p:presentation xmlns:a="http://schemas.openxmlformats.org/drawingml/2006/main" xmlns:r="http://schemas.openxmlformats.org/officeDocument/2006/relationships" xmlns:p="http://schemas.openxmlformats.org/presentationml/2006/main" saveSubsetFonts="1">
   <p:sldMasterIdLst>
-    <p:sldMasterId id="2147483677" r:id="rId1"/>
+    <p:sldMasterId id="2147483677" r:id="rId4"/>
   </p:sldMasterIdLst>
+  <p:notesMasterIdLst>
+    <p:notesMasterId r:id="rId15"/>
+  </p:notesMasterIdLst>
   <p:sldIdLst>
-    <p:sldId id="256" r:id="rId2"/>
-    <p:sldId id="257" r:id="rId3"/>
-    <p:sldId id="258" r:id="rId4"/>
-    <p:sldId id="259" r:id="rId5"/>
-    <p:sldId id="260" r:id="rId6"/>
-    <p:sldId id="261" r:id="rId7"/>
-    <p:sldId id="262" r:id="rId8"/>
+    <p:sldId id="256" r:id="rId5"/>
+    <p:sldId id="257" r:id="rId6"/>
+    <p:sldId id="263" r:id="rId7"/>
+    <p:sldId id="258" r:id="rId8"/>
+    <p:sldId id="259" r:id="rId9"/>
+    <p:sldId id="264" r:id="rId10"/>
+    <p:sldId id="260" r:id="rId11"/>
+    <p:sldId id="261" r:id="rId12"/>
+    <p:sldId id="262" r:id="rId13"/>
+    <p:sldId id="266" r:id="rId14"/>
   </p:sldIdLst>
   <p:sldSz cx="12192000" cy="6858000"/>
   <p:notesSz cx="6858000" cy="9144000"/>
@@ -116,6 +122,617 @@
     </p:ext>
   </p:extLst>
 </p:presentation>
+</file>
+
+<file path=ppt/revisionInfo.xml><?xml version="1.0" encoding="utf-8"?>
+<p1510:revInfo xmlns:a="http://schemas.openxmlformats.org/drawingml/2006/main" xmlns:r="http://schemas.openxmlformats.org/officeDocument/2006/relationships" xmlns:p1510="http://schemas.microsoft.com/office/powerpoint/2015/10/main">
+  <p1510:revLst>
+    <p1510:client id="{018CAC04-11C9-46FF-8D03-DC4A8092DB49}" v="5" dt="2020-09-28T00:09:18.368"/>
+    <p1510:client id="{5A21228C-BA5C-3C4F-B05B-6964EFDA7665}" v="26" dt="2020-09-28T02:11:18.300"/>
+    <p1510:client id="{96FD2807-A339-4E0B-B639-4BD7BB1FE83B}" v="139" dt="2020-09-28T00:16:04.568"/>
+  </p1510:revLst>
+</p1510:revInfo>
+</file>
+
+<file path=ppt/notesMasters/notesMaster1.xml><?xml version="1.0" encoding="utf-8"?>
+<p:notesMaster xmlns:a="http://schemas.openxmlformats.org/drawingml/2006/main" xmlns:r="http://schemas.openxmlformats.org/officeDocument/2006/relationships" xmlns:p="http://schemas.openxmlformats.org/presentationml/2006/main">
+  <p:cSld>
+    <p:bg>
+      <p:bgRef idx="1001">
+        <a:schemeClr val="bg1"/>
+      </p:bgRef>
+    </p:bg>
+    <p:spTree>
+      <p:nvGrpSpPr>
+        <p:cNvPr id="1" name=""/>
+        <p:cNvGrpSpPr/>
+        <p:nvPr/>
+      </p:nvGrpSpPr>
+      <p:grpSpPr>
+        <a:xfrm>
+          <a:off x="0" y="0"/>
+          <a:ext cx="0" cy="0"/>
+          <a:chOff x="0" y="0"/>
+          <a:chExt cx="0" cy="0"/>
+        </a:xfrm>
+      </p:grpSpPr>
+      <p:sp>
+        <p:nvSpPr>
+          <p:cNvPr id="2" name="Header Placeholder 1"/>
+          <p:cNvSpPr>
+            <a:spLocks noGrp="1"/>
+          </p:cNvSpPr>
+          <p:nvPr>
+            <p:ph type="hdr" sz="quarter"/>
+          </p:nvPr>
+        </p:nvSpPr>
+        <p:spPr>
+          <a:xfrm>
+            <a:off x="0" y="0"/>
+            <a:ext cx="2971800" cy="458788"/>
+          </a:xfrm>
+          <a:prstGeom prst="rect">
+            <a:avLst/>
+          </a:prstGeom>
+        </p:spPr>
+        <p:txBody>
+          <a:bodyPr vert="horz" lIns="91440" tIns="45720" rIns="91440" bIns="45720" rtlCol="0"/>
+          <a:lstStyle>
+            <a:lvl1pPr algn="l">
+              <a:defRPr sz="1200"/>
+            </a:lvl1pPr>
+          </a:lstStyle>
+          <a:p>
+            <a:endParaRPr lang="en-US"/>
+          </a:p>
+        </p:txBody>
+      </p:sp>
+      <p:sp>
+        <p:nvSpPr>
+          <p:cNvPr id="3" name="Date Placeholder 2"/>
+          <p:cNvSpPr>
+            <a:spLocks noGrp="1"/>
+          </p:cNvSpPr>
+          <p:nvPr>
+            <p:ph type="dt" idx="1"/>
+          </p:nvPr>
+        </p:nvSpPr>
+        <p:spPr>
+          <a:xfrm>
+            <a:off x="3884613" y="0"/>
+            <a:ext cx="2971800" cy="458788"/>
+          </a:xfrm>
+          <a:prstGeom prst="rect">
+            <a:avLst/>
+          </a:prstGeom>
+        </p:spPr>
+        <p:txBody>
+          <a:bodyPr vert="horz" lIns="91440" tIns="45720" rIns="91440" bIns="45720" rtlCol="0"/>
+          <a:lstStyle>
+            <a:lvl1pPr algn="r">
+              <a:defRPr sz="1200"/>
+            </a:lvl1pPr>
+          </a:lstStyle>
+          <a:p>
+            <a:fld id="{9423F89A-7395-9042-8AC9-73AE495C7C8E}" type="datetimeFigureOut">
+              <a:rPr lang="en-US" smtClean="0"/>
+              <a:t>9/27/20</a:t>
+            </a:fld>
+            <a:endParaRPr lang="en-US"/>
+          </a:p>
+        </p:txBody>
+      </p:sp>
+      <p:sp>
+        <p:nvSpPr>
+          <p:cNvPr id="4" name="Slide Image Placeholder 3"/>
+          <p:cNvSpPr>
+            <a:spLocks noGrp="1" noRot="1" noChangeAspect="1"/>
+          </p:cNvSpPr>
+          <p:nvPr>
+            <p:ph type="sldImg" idx="2"/>
+          </p:nvPr>
+        </p:nvSpPr>
+        <p:spPr>
+          <a:xfrm>
+            <a:off x="685800" y="1143000"/>
+            <a:ext cx="5486400" cy="3086100"/>
+          </a:xfrm>
+          <a:prstGeom prst="rect">
+            <a:avLst/>
+          </a:prstGeom>
+          <a:noFill/>
+          <a:ln w="12700">
+            <a:solidFill>
+              <a:prstClr val="black"/>
+            </a:solidFill>
+          </a:ln>
+        </p:spPr>
+        <p:txBody>
+          <a:bodyPr vert="horz" lIns="91440" tIns="45720" rIns="91440" bIns="45720" rtlCol="0" anchor="ctr"/>
+          <a:lstStyle/>
+          <a:p>
+            <a:endParaRPr lang="en-US"/>
+          </a:p>
+        </p:txBody>
+      </p:sp>
+      <p:sp>
+        <p:nvSpPr>
+          <p:cNvPr id="5" name="Notes Placeholder 4"/>
+          <p:cNvSpPr>
+            <a:spLocks noGrp="1"/>
+          </p:cNvSpPr>
+          <p:nvPr>
+            <p:ph type="body" sz="quarter" idx="3"/>
+          </p:nvPr>
+        </p:nvSpPr>
+        <p:spPr>
+          <a:xfrm>
+            <a:off x="685800" y="4400550"/>
+            <a:ext cx="5486400" cy="3600450"/>
+          </a:xfrm>
+          <a:prstGeom prst="rect">
+            <a:avLst/>
+          </a:prstGeom>
+        </p:spPr>
+        <p:txBody>
+          <a:bodyPr vert="horz" lIns="91440" tIns="45720" rIns="91440" bIns="45720" rtlCol="0"/>
+          <a:lstStyle/>
+          <a:p>
+            <a:pPr lvl="0"/>
+            <a:r>
+              <a:rPr lang="en-US"/>
+              <a:t>Click to edit Master text styles</a:t>
+            </a:r>
+          </a:p>
+          <a:p>
+            <a:pPr lvl="1"/>
+            <a:r>
+              <a:rPr lang="en-US"/>
+              <a:t>Second level</a:t>
+            </a:r>
+          </a:p>
+          <a:p>
+            <a:pPr lvl="2"/>
+            <a:r>
+              <a:rPr lang="en-US"/>
+              <a:t>Third level</a:t>
+            </a:r>
+          </a:p>
+          <a:p>
+            <a:pPr lvl="3"/>
+            <a:r>
+              <a:rPr lang="en-US"/>
+              <a:t>Fourth level</a:t>
+            </a:r>
+          </a:p>
+          <a:p>
+            <a:pPr lvl="4"/>
+            <a:r>
+              <a:rPr lang="en-US"/>
+              <a:t>Fifth level</a:t>
+            </a:r>
+          </a:p>
+        </p:txBody>
+      </p:sp>
+      <p:sp>
+        <p:nvSpPr>
+          <p:cNvPr id="6" name="Footer Placeholder 5"/>
+          <p:cNvSpPr>
+            <a:spLocks noGrp="1"/>
+          </p:cNvSpPr>
+          <p:nvPr>
+            <p:ph type="ftr" sz="quarter" idx="4"/>
+          </p:nvPr>
+        </p:nvSpPr>
+        <p:spPr>
+          <a:xfrm>
+            <a:off x="0" y="8685213"/>
+            <a:ext cx="2971800" cy="458787"/>
+          </a:xfrm>
+          <a:prstGeom prst="rect">
+            <a:avLst/>
+          </a:prstGeom>
+        </p:spPr>
+        <p:txBody>
+          <a:bodyPr vert="horz" lIns="91440" tIns="45720" rIns="91440" bIns="45720" rtlCol="0" anchor="b"/>
+          <a:lstStyle>
+            <a:lvl1pPr algn="l">
+              <a:defRPr sz="1200"/>
+            </a:lvl1pPr>
+          </a:lstStyle>
+          <a:p>
+            <a:endParaRPr lang="en-US"/>
+          </a:p>
+        </p:txBody>
+      </p:sp>
+      <p:sp>
+        <p:nvSpPr>
+          <p:cNvPr id="7" name="Slide Number Placeholder 6"/>
+          <p:cNvSpPr>
+            <a:spLocks noGrp="1"/>
+          </p:cNvSpPr>
+          <p:nvPr>
+            <p:ph type="sldNum" sz="quarter" idx="5"/>
+          </p:nvPr>
+        </p:nvSpPr>
+        <p:spPr>
+          <a:xfrm>
+            <a:off x="3884613" y="8685213"/>
+            <a:ext cx="2971800" cy="458787"/>
+          </a:xfrm>
+          <a:prstGeom prst="rect">
+            <a:avLst/>
+          </a:prstGeom>
+        </p:spPr>
+        <p:txBody>
+          <a:bodyPr vert="horz" lIns="91440" tIns="45720" rIns="91440" bIns="45720" rtlCol="0" anchor="b"/>
+          <a:lstStyle>
+            <a:lvl1pPr algn="r">
+              <a:defRPr sz="1200"/>
+            </a:lvl1pPr>
+          </a:lstStyle>
+          <a:p>
+            <a:fld id="{FDBA5916-59AF-1E4A-A4FE-5C2D2BB9B815}" type="slidenum">
+              <a:rPr lang="en-US" smtClean="0"/>
+              <a:t>‹#›</a:t>
+            </a:fld>
+            <a:endParaRPr lang="en-US"/>
+          </a:p>
+        </p:txBody>
+      </p:sp>
+    </p:spTree>
+    <p:extLst>
+      <p:ext uri="{BB962C8B-B14F-4D97-AF65-F5344CB8AC3E}">
+        <p14:creationId xmlns:p14="http://schemas.microsoft.com/office/powerpoint/2010/main" val="3654917913"/>
+      </p:ext>
+    </p:extLst>
+  </p:cSld>
+  <p:clrMap bg1="lt1" tx1="dk1" bg2="lt2" tx2="dk2" accent1="accent1" accent2="accent2" accent3="accent3" accent4="accent4" accent5="accent5" accent6="accent6" hlink="hlink" folHlink="folHlink"/>
+  <p:notesStyle>
+    <a:lvl1pPr marL="0" algn="l" defTabSz="914400" rtl="0" eaLnBrk="1" latinLnBrk="0" hangingPunct="1">
+      <a:defRPr sz="1200" kern="1200">
+        <a:solidFill>
+          <a:schemeClr val="tx1"/>
+        </a:solidFill>
+        <a:latin typeface="+mn-lt"/>
+        <a:ea typeface="+mn-ea"/>
+        <a:cs typeface="+mn-cs"/>
+      </a:defRPr>
+    </a:lvl1pPr>
+    <a:lvl2pPr marL="457200" algn="l" defTabSz="914400" rtl="0" eaLnBrk="1" latinLnBrk="0" hangingPunct="1">
+      <a:defRPr sz="1200" kern="1200">
+        <a:solidFill>
+          <a:schemeClr val="tx1"/>
+        </a:solidFill>
+        <a:latin typeface="+mn-lt"/>
+        <a:ea typeface="+mn-ea"/>
+        <a:cs typeface="+mn-cs"/>
+      </a:defRPr>
+    </a:lvl2pPr>
+    <a:lvl3pPr marL="914400" algn="l" defTabSz="914400" rtl="0" eaLnBrk="1" latinLnBrk="0" hangingPunct="1">
+      <a:defRPr sz="1200" kern="1200">
+        <a:solidFill>
+          <a:schemeClr val="tx1"/>
+        </a:solidFill>
+        <a:latin typeface="+mn-lt"/>
+        <a:ea typeface="+mn-ea"/>
+        <a:cs typeface="+mn-cs"/>
+      </a:defRPr>
+    </a:lvl3pPr>
+    <a:lvl4pPr marL="1371600" algn="l" defTabSz="914400" rtl="0" eaLnBrk="1" latinLnBrk="0" hangingPunct="1">
+      <a:defRPr sz="1200" kern="1200">
+        <a:solidFill>
+          <a:schemeClr val="tx1"/>
+        </a:solidFill>
+        <a:latin typeface="+mn-lt"/>
+        <a:ea typeface="+mn-ea"/>
+        <a:cs typeface="+mn-cs"/>
+      </a:defRPr>
+    </a:lvl4pPr>
+    <a:lvl5pPr marL="1828800" algn="l" defTabSz="914400" rtl="0" eaLnBrk="1" latinLnBrk="0" hangingPunct="1">
+      <a:defRPr sz="1200" kern="1200">
+        <a:solidFill>
+          <a:schemeClr val="tx1"/>
+        </a:solidFill>
+        <a:latin typeface="+mn-lt"/>
+        <a:ea typeface="+mn-ea"/>
+        <a:cs typeface="+mn-cs"/>
+      </a:defRPr>
+    </a:lvl5pPr>
+    <a:lvl6pPr marL="2286000" algn="l" defTabSz="914400" rtl="0" eaLnBrk="1" latinLnBrk="0" hangingPunct="1">
+      <a:defRPr sz="1200" kern="1200">
+        <a:solidFill>
+          <a:schemeClr val="tx1"/>
+        </a:solidFill>
+        <a:latin typeface="+mn-lt"/>
+        <a:ea typeface="+mn-ea"/>
+        <a:cs typeface="+mn-cs"/>
+      </a:defRPr>
+    </a:lvl6pPr>
+    <a:lvl7pPr marL="2743200" algn="l" defTabSz="914400" rtl="0" eaLnBrk="1" latinLnBrk="0" hangingPunct="1">
+      <a:defRPr sz="1200" kern="1200">
+        <a:solidFill>
+          <a:schemeClr val="tx1"/>
+        </a:solidFill>
+        <a:latin typeface="+mn-lt"/>
+        <a:ea typeface="+mn-ea"/>
+        <a:cs typeface="+mn-cs"/>
+      </a:defRPr>
+    </a:lvl7pPr>
+    <a:lvl8pPr marL="3200400" algn="l" defTabSz="914400" rtl="0" eaLnBrk="1" latinLnBrk="0" hangingPunct="1">
+      <a:defRPr sz="1200" kern="1200">
+        <a:solidFill>
+          <a:schemeClr val="tx1"/>
+        </a:solidFill>
+        <a:latin typeface="+mn-lt"/>
+        <a:ea typeface="+mn-ea"/>
+        <a:cs typeface="+mn-cs"/>
+      </a:defRPr>
+    </a:lvl8pPr>
+    <a:lvl9pPr marL="3657600" algn="l" defTabSz="914400" rtl="0" eaLnBrk="1" latinLnBrk="0" hangingPunct="1">
+      <a:defRPr sz="1200" kern="1200">
+        <a:solidFill>
+          <a:schemeClr val="tx1"/>
+        </a:solidFill>
+        <a:latin typeface="+mn-lt"/>
+        <a:ea typeface="+mn-ea"/>
+        <a:cs typeface="+mn-cs"/>
+      </a:defRPr>
+    </a:lvl9pPr>
+  </p:notesStyle>
+</p:notesMaster>
+</file>
+
+<file path=ppt/notesSlides/notesSlide1.xml><?xml version="1.0" encoding="utf-8"?>
+<p:notes xmlns:a="http://schemas.openxmlformats.org/drawingml/2006/main" xmlns:r="http://schemas.openxmlformats.org/officeDocument/2006/relationships" xmlns:p="http://schemas.openxmlformats.org/presentationml/2006/main">
+  <p:cSld>
+    <p:spTree>
+      <p:nvGrpSpPr>
+        <p:cNvPr id="1" name=""/>
+        <p:cNvGrpSpPr/>
+        <p:nvPr/>
+      </p:nvGrpSpPr>
+      <p:grpSpPr>
+        <a:xfrm>
+          <a:off x="0" y="0"/>
+          <a:ext cx="0" cy="0"/>
+          <a:chOff x="0" y="0"/>
+          <a:chExt cx="0" cy="0"/>
+        </a:xfrm>
+      </p:grpSpPr>
+      <p:sp>
+        <p:nvSpPr>
+          <p:cNvPr id="2" name="Slide Image Placeholder 1"/>
+          <p:cNvSpPr>
+            <a:spLocks noGrp="1" noRot="1" noChangeAspect="1"/>
+          </p:cNvSpPr>
+          <p:nvPr>
+            <p:ph type="sldImg"/>
+          </p:nvPr>
+        </p:nvSpPr>
+        <p:spPr/>
+      </p:sp>
+      <p:sp>
+        <p:nvSpPr>
+          <p:cNvPr id="3" name="Notes Placeholder 2"/>
+          <p:cNvSpPr>
+            <a:spLocks noGrp="1"/>
+          </p:cNvSpPr>
+          <p:nvPr>
+            <p:ph type="body" idx="1"/>
+          </p:nvPr>
+        </p:nvSpPr>
+        <p:spPr/>
+        <p:txBody>
+          <a:bodyPr/>
+          <a:lstStyle/>
+          <a:p>
+            <a:endParaRPr lang="en-US" dirty="0"/>
+          </a:p>
+        </p:txBody>
+      </p:sp>
+      <p:sp>
+        <p:nvSpPr>
+          <p:cNvPr id="4" name="Slide Number Placeholder 3"/>
+          <p:cNvSpPr>
+            <a:spLocks noGrp="1"/>
+          </p:cNvSpPr>
+          <p:nvPr>
+            <p:ph type="sldNum" sz="quarter" idx="5"/>
+          </p:nvPr>
+        </p:nvSpPr>
+        <p:spPr/>
+        <p:txBody>
+          <a:bodyPr/>
+          <a:lstStyle/>
+          <a:p>
+            <a:fld id="{FDBA5916-59AF-1E4A-A4FE-5C2D2BB9B815}" type="slidenum">
+              <a:rPr lang="en-US" smtClean="0"/>
+              <a:t>1</a:t>
+            </a:fld>
+            <a:endParaRPr lang="en-US"/>
+          </a:p>
+        </p:txBody>
+      </p:sp>
+    </p:spTree>
+    <p:extLst>
+      <p:ext uri="{BB962C8B-B14F-4D97-AF65-F5344CB8AC3E}">
+        <p14:creationId xmlns:p14="http://schemas.microsoft.com/office/powerpoint/2010/main" val="3078191606"/>
+      </p:ext>
+    </p:extLst>
+  </p:cSld>
+  <p:clrMapOvr>
+    <a:masterClrMapping/>
+  </p:clrMapOvr>
+</p:notes>
+</file>
+
+<file path=ppt/notesSlides/notesSlide2.xml><?xml version="1.0" encoding="utf-8"?>
+<p:notes xmlns:a="http://schemas.openxmlformats.org/drawingml/2006/main" xmlns:r="http://schemas.openxmlformats.org/officeDocument/2006/relationships" xmlns:p="http://schemas.openxmlformats.org/presentationml/2006/main">
+  <p:cSld>
+    <p:spTree>
+      <p:nvGrpSpPr>
+        <p:cNvPr id="1" name=""/>
+        <p:cNvGrpSpPr/>
+        <p:nvPr/>
+      </p:nvGrpSpPr>
+      <p:grpSpPr>
+        <a:xfrm>
+          <a:off x="0" y="0"/>
+          <a:ext cx="0" cy="0"/>
+          <a:chOff x="0" y="0"/>
+          <a:chExt cx="0" cy="0"/>
+        </a:xfrm>
+      </p:grpSpPr>
+      <p:sp>
+        <p:nvSpPr>
+          <p:cNvPr id="2" name="Slide Image Placeholder 1"/>
+          <p:cNvSpPr>
+            <a:spLocks noGrp="1" noRot="1" noChangeAspect="1"/>
+          </p:cNvSpPr>
+          <p:nvPr>
+            <p:ph type="sldImg"/>
+          </p:nvPr>
+        </p:nvSpPr>
+        <p:spPr/>
+      </p:sp>
+      <p:sp>
+        <p:nvSpPr>
+          <p:cNvPr id="3" name="Notes Placeholder 2"/>
+          <p:cNvSpPr>
+            <a:spLocks noGrp="1"/>
+          </p:cNvSpPr>
+          <p:nvPr>
+            <p:ph type="body" idx="1"/>
+          </p:nvPr>
+        </p:nvSpPr>
+        <p:spPr/>
+        <p:txBody>
+          <a:bodyPr/>
+          <a:lstStyle/>
+          <a:p>
+            <a:endParaRPr lang="en-US" dirty="0"/>
+          </a:p>
+        </p:txBody>
+      </p:sp>
+      <p:sp>
+        <p:nvSpPr>
+          <p:cNvPr id="4" name="Slide Number Placeholder 3"/>
+          <p:cNvSpPr>
+            <a:spLocks noGrp="1"/>
+          </p:cNvSpPr>
+          <p:nvPr>
+            <p:ph type="sldNum" sz="quarter" idx="5"/>
+          </p:nvPr>
+        </p:nvSpPr>
+        <p:spPr/>
+        <p:txBody>
+          <a:bodyPr/>
+          <a:lstStyle/>
+          <a:p>
+            <a:fld id="{FDBA5916-59AF-1E4A-A4FE-5C2D2BB9B815}" type="slidenum">
+              <a:rPr lang="en-US" smtClean="0"/>
+              <a:t>2</a:t>
+            </a:fld>
+            <a:endParaRPr lang="en-US"/>
+          </a:p>
+        </p:txBody>
+      </p:sp>
+    </p:spTree>
+    <p:extLst>
+      <p:ext uri="{BB962C8B-B14F-4D97-AF65-F5344CB8AC3E}">
+        <p14:creationId xmlns:p14="http://schemas.microsoft.com/office/powerpoint/2010/main" val="3914226839"/>
+      </p:ext>
+    </p:extLst>
+  </p:cSld>
+  <p:clrMapOvr>
+    <a:masterClrMapping/>
+  </p:clrMapOvr>
+</p:notes>
+</file>
+
+<file path=ppt/notesSlides/notesSlide3.xml><?xml version="1.0" encoding="utf-8"?>
+<p:notes xmlns:a="http://schemas.openxmlformats.org/drawingml/2006/main" xmlns:r="http://schemas.openxmlformats.org/officeDocument/2006/relationships" xmlns:p="http://schemas.openxmlformats.org/presentationml/2006/main">
+  <p:cSld>
+    <p:spTree>
+      <p:nvGrpSpPr>
+        <p:cNvPr id="1" name=""/>
+        <p:cNvGrpSpPr/>
+        <p:nvPr/>
+      </p:nvGrpSpPr>
+      <p:grpSpPr>
+        <a:xfrm>
+          <a:off x="0" y="0"/>
+          <a:ext cx="0" cy="0"/>
+          <a:chOff x="0" y="0"/>
+          <a:chExt cx="0" cy="0"/>
+        </a:xfrm>
+      </p:grpSpPr>
+      <p:sp>
+        <p:nvSpPr>
+          <p:cNvPr id="2" name="Slide Image Placeholder 1"/>
+          <p:cNvSpPr>
+            <a:spLocks noGrp="1" noRot="1" noChangeAspect="1"/>
+          </p:cNvSpPr>
+          <p:nvPr>
+            <p:ph type="sldImg"/>
+          </p:nvPr>
+        </p:nvSpPr>
+        <p:spPr/>
+      </p:sp>
+      <p:sp>
+        <p:nvSpPr>
+          <p:cNvPr id="3" name="Notes Placeholder 2"/>
+          <p:cNvSpPr>
+            <a:spLocks noGrp="1"/>
+          </p:cNvSpPr>
+          <p:nvPr>
+            <p:ph type="body" idx="1"/>
+          </p:nvPr>
+        </p:nvSpPr>
+        <p:spPr/>
+        <p:txBody>
+          <a:bodyPr/>
+          <a:lstStyle/>
+          <a:p>
+            <a:endParaRPr lang="en-US" dirty="0"/>
+          </a:p>
+        </p:txBody>
+      </p:sp>
+      <p:sp>
+        <p:nvSpPr>
+          <p:cNvPr id="4" name="Slide Number Placeholder 3"/>
+          <p:cNvSpPr>
+            <a:spLocks noGrp="1"/>
+          </p:cNvSpPr>
+          <p:nvPr>
+            <p:ph type="sldNum" sz="quarter" idx="5"/>
+          </p:nvPr>
+        </p:nvSpPr>
+        <p:spPr/>
+        <p:txBody>
+          <a:bodyPr/>
+          <a:lstStyle/>
+          <a:p>
+            <a:fld id="{FDBA5916-59AF-1E4A-A4FE-5C2D2BB9B815}" type="slidenum">
+              <a:rPr lang="en-US" smtClean="0"/>
+              <a:t>4</a:t>
+            </a:fld>
+            <a:endParaRPr lang="en-US"/>
+          </a:p>
+        </p:txBody>
+      </p:sp>
+    </p:spTree>
+    <p:extLst>
+      <p:ext uri="{BB962C8B-B14F-4D97-AF65-F5344CB8AC3E}">
+        <p14:creationId xmlns:p14="http://schemas.microsoft.com/office/powerpoint/2010/main" val="47918490"/>
+      </p:ext>
+    </p:extLst>
+  </p:cSld>
+  <p:clrMapOvr>
+    <a:masterClrMapping/>
+  </p:clrMapOvr>
+</p:notes>
 </file>
 
 <file path=ppt/slideLayouts/slideLayout1.xml><?xml version="1.0" encoding="utf-8"?>
@@ -842,7 +1459,7 @@
           <a:p>
             <a:fld id="{50A20B50-CD93-4409-9A92-1322BC8DCCFF}" type="datetimeFigureOut">
               <a:rPr lang="en-US" smtClean="0"/>
-              <a:t>9/27/2020</a:t>
+              <a:t>9/27/20</a:t>
             </a:fld>
             <a:endParaRPr lang="en-US"/>
           </a:p>
@@ -1093,7 +1710,7 @@
           <a:p>
             <a:fld id="{50A20B50-CD93-4409-9A92-1322BC8DCCFF}" type="datetimeFigureOut">
               <a:rPr lang="en-US" smtClean="0"/>
-              <a:t>9/27/2020</a:t>
+              <a:t>9/27/20</a:t>
             </a:fld>
             <a:endParaRPr lang="en-US"/>
           </a:p>
@@ -1407,7 +2024,7 @@
           <a:p>
             <a:fld id="{50A20B50-CD93-4409-9A92-1322BC8DCCFF}" type="datetimeFigureOut">
               <a:rPr lang="en-US" smtClean="0"/>
-              <a:t>9/27/2020</a:t>
+              <a:t>9/27/20</a:t>
             </a:fld>
             <a:endParaRPr lang="en-US"/>
           </a:p>
@@ -1734,7 +2351,7 @@
           <a:p>
             <a:fld id="{50A20B50-CD93-4409-9A92-1322BC8DCCFF}" type="datetimeFigureOut">
               <a:rPr lang="en-US" smtClean="0"/>
-              <a:t>9/27/2020</a:t>
+              <a:t>9/27/20</a:t>
             </a:fld>
             <a:endParaRPr lang="en-US"/>
           </a:p>
@@ -2048,7 +2665,7 @@
           <a:p>
             <a:fld id="{50A20B50-CD93-4409-9A92-1322BC8DCCFF}" type="datetimeFigureOut">
               <a:rPr lang="en-US" smtClean="0"/>
-              <a:t>9/27/2020</a:t>
+              <a:t>9/27/20</a:t>
             </a:fld>
             <a:endParaRPr lang="en-US"/>
           </a:p>
@@ -2435,7 +3052,7 @@
           <a:p>
             <a:fld id="{50A20B50-CD93-4409-9A92-1322BC8DCCFF}" type="datetimeFigureOut">
               <a:rPr lang="en-US" smtClean="0"/>
-              <a:t>9/27/2020</a:t>
+              <a:t>9/27/20</a:t>
             </a:fld>
             <a:endParaRPr lang="en-US"/>
           </a:p>
@@ -2605,7 +3222,7 @@
           <a:p>
             <a:fld id="{50A20B50-CD93-4409-9A92-1322BC8DCCFF}" type="datetimeFigureOut">
               <a:rPr lang="en-US" smtClean="0"/>
-              <a:t>9/27/2020</a:t>
+              <a:t>9/27/20</a:t>
             </a:fld>
             <a:endParaRPr lang="en-US"/>
           </a:p>
@@ -2785,7 +3402,7 @@
           <a:p>
             <a:fld id="{50A20B50-CD93-4409-9A92-1322BC8DCCFF}" type="datetimeFigureOut">
               <a:rPr lang="en-US" smtClean="0"/>
-              <a:t>9/27/2020</a:t>
+              <a:t>9/27/20</a:t>
             </a:fld>
             <a:endParaRPr lang="en-US"/>
           </a:p>
@@ -2961,7 +3578,7 @@
           <a:p>
             <a:fld id="{50A20B50-CD93-4409-9A92-1322BC8DCCFF}" type="datetimeFigureOut">
               <a:rPr lang="en-US" smtClean="0"/>
-              <a:t>9/27/2020</a:t>
+              <a:t>9/27/20</a:t>
             </a:fld>
             <a:endParaRPr lang="en-US"/>
           </a:p>
@@ -3208,7 +3825,7 @@
           <a:p>
             <a:fld id="{50A20B50-CD93-4409-9A92-1322BC8DCCFF}" type="datetimeFigureOut">
               <a:rPr lang="en-US" smtClean="0"/>
-              <a:t>9/27/2020</a:t>
+              <a:t>9/27/20</a:t>
             </a:fld>
             <a:endParaRPr lang="en-US"/>
           </a:p>
@@ -3440,7 +4057,7 @@
           <a:p>
             <a:fld id="{50A20B50-CD93-4409-9A92-1322BC8DCCFF}" type="datetimeFigureOut">
               <a:rPr lang="en-US" smtClean="0"/>
-              <a:t>9/27/2020</a:t>
+              <a:t>9/27/20</a:t>
             </a:fld>
             <a:endParaRPr lang="en-US"/>
           </a:p>
@@ -3814,7 +4431,7 @@
           <a:p>
             <a:fld id="{50A20B50-CD93-4409-9A92-1322BC8DCCFF}" type="datetimeFigureOut">
               <a:rPr lang="en-US" smtClean="0"/>
-              <a:t>9/27/2020</a:t>
+              <a:t>9/27/20</a:t>
             </a:fld>
             <a:endParaRPr lang="en-US"/>
           </a:p>
@@ -3937,7 +4554,7 @@
           <a:p>
             <a:fld id="{50A20B50-CD93-4409-9A92-1322BC8DCCFF}" type="datetimeFigureOut">
               <a:rPr lang="en-US" smtClean="0"/>
-              <a:t>9/27/2020</a:t>
+              <a:t>9/27/20</a:t>
             </a:fld>
             <a:endParaRPr lang="en-US"/>
           </a:p>
@@ -4032,7 +4649,7 @@
           <a:p>
             <a:fld id="{50A20B50-CD93-4409-9A92-1322BC8DCCFF}" type="datetimeFigureOut">
               <a:rPr lang="en-US" smtClean="0"/>
-              <a:t>9/27/2020</a:t>
+              <a:t>9/27/20</a:t>
             </a:fld>
             <a:endParaRPr lang="en-US"/>
           </a:p>
@@ -4287,7 +4904,7 @@
           <a:p>
             <a:fld id="{50A20B50-CD93-4409-9A92-1322BC8DCCFF}" type="datetimeFigureOut">
               <a:rPr lang="en-US" smtClean="0"/>
-              <a:t>9/27/2020</a:t>
+              <a:t>9/27/20</a:t>
             </a:fld>
             <a:endParaRPr lang="en-US"/>
           </a:p>
@@ -4550,7 +5167,7 @@
           <a:p>
             <a:fld id="{50A20B50-CD93-4409-9A92-1322BC8DCCFF}" type="datetimeFigureOut">
               <a:rPr lang="en-US" smtClean="0"/>
-              <a:t>9/27/2020</a:t>
+              <a:t>9/27/20</a:t>
             </a:fld>
             <a:endParaRPr lang="en-US"/>
           </a:p>
@@ -5295,7 +5912,7 @@
           <a:p>
             <a:fld id="{50A20B50-CD93-4409-9A92-1322BC8DCCFF}" type="datetimeFigureOut">
               <a:rPr lang="en-US" smtClean="0"/>
-              <a:t>9/27/2020</a:t>
+              <a:t>9/27/20</a:t>
             </a:fld>
             <a:endParaRPr lang="en-US"/>
           </a:p>
@@ -5835,7 +6452,12 @@
             <p:ph type="ctrTitle"/>
           </p:nvPr>
         </p:nvSpPr>
-        <p:spPr/>
+        <p:spPr>
+          <a:xfrm>
+            <a:off x="1507067" y="1782698"/>
+            <a:ext cx="7766936" cy="1646302"/>
+          </a:xfrm>
+        </p:spPr>
         <p:txBody>
           <a:bodyPr/>
           <a:lstStyle/>
@@ -5900,6 +6522,79 @@
           </a:p>
         </p:txBody>
       </p:sp>
+      <p:sp>
+        <p:nvSpPr>
+          <p:cNvPr id="5" name="TextBox 4">
+            <a:extLst>
+              <a:ext uri="{FF2B5EF4-FFF2-40B4-BE49-F238E27FC236}">
+                <a16:creationId xmlns:a16="http://schemas.microsoft.com/office/drawing/2014/main" id="{A7DB1974-7364-7848-9BBD-0656EA1DB19C}"/>
+              </a:ext>
+            </a:extLst>
+          </p:cNvPr>
+          <p:cNvSpPr txBox="1"/>
+          <p:nvPr/>
+        </p:nvSpPr>
+        <p:spPr>
+          <a:xfrm>
+            <a:off x="6067548" y="3377702"/>
+            <a:ext cx="3206455" cy="523220"/>
+          </a:xfrm>
+          <a:prstGeom prst="rect">
+            <a:avLst/>
+          </a:prstGeom>
+          <a:noFill/>
+        </p:spPr>
+        <p:txBody>
+          <a:bodyPr wrap="none" rtlCol="0">
+            <a:spAutoFit/>
+          </a:bodyPr>
+          <a:lstStyle/>
+          <a:p>
+            <a:r>
+              <a:rPr lang="en-US" sz="2800" dirty="0"/>
+              <a:t>public class TeamD</a:t>
+            </a:r>
+          </a:p>
+        </p:txBody>
+      </p:sp>
+      <p:pic>
+        <p:nvPicPr>
+          <p:cNvPr id="7" name="Audio 6">
+            <a:hlinkClick r:id="" action="ppaction://media"/>
+            <a:extLst>
+              <a:ext uri="{FF2B5EF4-FFF2-40B4-BE49-F238E27FC236}">
+                <a16:creationId xmlns:a16="http://schemas.microsoft.com/office/drawing/2014/main" id="{AFAF294D-1CB0-D44F-9D5E-0398AE55B8B3}"/>
+              </a:ext>
+            </a:extLst>
+          </p:cNvPr>
+          <p:cNvPicPr>
+            <a:picLocks noChangeAspect="1"/>
+          </p:cNvPicPr>
+          <p:nvPr>
+            <a:audioFile r:link="rId2"/>
+            <p:extLst>
+              <p:ext uri="{DAA4B4D4-6D71-4841-9C94-3DE7FCFB9230}">
+                <p14:media xmlns:p14="http://schemas.microsoft.com/office/powerpoint/2010/main" r:embed="rId1"/>
+              </p:ext>
+            </p:extLst>
+          </p:nvPr>
+        </p:nvPicPr>
+        <p:blipFill>
+          <a:blip r:embed="rId5"/>
+          <a:stretch>
+            <a:fillRect/>
+          </a:stretch>
+        </p:blipFill>
+        <p:spPr>
+          <a:xfrm>
+            <a:off x="11226800" y="5892800"/>
+            <a:ext cx="812800" cy="812800"/>
+          </a:xfrm>
+          <a:prstGeom prst="rect">
+            <a:avLst/>
+          </a:prstGeom>
+        </p:spPr>
+      </p:pic>
     </p:spTree>
     <p:extLst>
       <p:ext uri="{BB962C8B-B14F-4D97-AF65-F5344CB8AC3E}">
@@ -5910,6 +6605,337 @@
   <p:clrMapOvr>
     <a:masterClrMapping/>
   </p:clrMapOvr>
+  <mc:AlternateContent xmlns:mc="http://schemas.openxmlformats.org/markup-compatibility/2006">
+    <mc:Choice xmlns:p14="http://schemas.microsoft.com/office/powerpoint/2010/main" Requires="p14">
+      <p:transition spd="slow" p14:dur="2000" advTm="8615"/>
+    </mc:Choice>
+    <mc:Fallback>
+      <p:transition spd="slow" advTm="8615"/>
+    </mc:Fallback>
+  </mc:AlternateContent>
+  <p:timing>
+    <p:tnLst>
+      <p:par>
+        <p:cTn id="1" dur="indefinite" restart="never" nodeType="tmRoot">
+          <p:childTnLst>
+            <p:seq concurrent="1" nextAc="seek">
+              <p:cTn id="2" dur="indefinite" nodeType="mainSeq">
+                <p:childTnLst>
+                  <p:par>
+                    <p:cTn id="3" fill="hold">
+                      <p:stCondLst>
+                        <p:cond delay="indefinite"/>
+                        <p:cond evt="onBegin" delay="0">
+                          <p:tn val="2"/>
+                        </p:cond>
+                      </p:stCondLst>
+                      <p:childTnLst>
+                        <p:par>
+                          <p:cTn id="4" fill="hold">
+                            <p:stCondLst>
+                              <p:cond delay="0"/>
+                            </p:stCondLst>
+                            <p:childTnLst>
+                              <p:par>
+                                <p:cTn id="5" presetID="1" presetClass="mediacall" presetSubtype="0" fill="hold" nodeType="afterEffect">
+                                  <p:stCondLst>
+                                    <p:cond delay="0"/>
+                                  </p:stCondLst>
+                                  <p:childTnLst>
+                                    <p:cmd type="call" cmd="playFrom(0.0)">
+                                      <p:cBhvr>
+                                        <p:cTn id="6" dur="1" fill="hold"/>
+                                        <p:tgtEl>
+                                          <p:spTgt spid="7"/>
+                                        </p:tgtEl>
+                                      </p:cBhvr>
+                                    </p:cmd>
+                                  </p:childTnLst>
+                                </p:cTn>
+                              </p:par>
+                            </p:childTnLst>
+                          </p:cTn>
+                        </p:par>
+                      </p:childTnLst>
+                    </p:cTn>
+                  </p:par>
+                </p:childTnLst>
+              </p:cTn>
+              <p:prevCondLst>
+                <p:cond evt="onPrev" delay="0">
+                  <p:tgtEl>
+                    <p:sldTgt/>
+                  </p:tgtEl>
+                </p:cond>
+              </p:prevCondLst>
+              <p:nextCondLst>
+                <p:cond evt="onNext" delay="0">
+                  <p:tgtEl>
+                    <p:sldTgt/>
+                  </p:tgtEl>
+                </p:cond>
+              </p:nextCondLst>
+            </p:seq>
+            <p:audio isNarration="1">
+              <p:cMediaNode vol="80000" showWhenStopped="0">
+                <p:cTn id="7" fill="hold" display="0">
+                  <p:stCondLst>
+                    <p:cond delay="indefinite"/>
+                  </p:stCondLst>
+                  <p:endCondLst>
+                    <p:cond evt="onStopAudio" delay="0">
+                      <p:tgtEl>
+                        <p:sldTgt/>
+                      </p:tgtEl>
+                    </p:cond>
+                  </p:endCondLst>
+                </p:cTn>
+                <p:tgtEl>
+                  <p:spTgt spid="7"/>
+                </p:tgtEl>
+              </p:cMediaNode>
+            </p:audio>
+          </p:childTnLst>
+        </p:cTn>
+      </p:par>
+    </p:tnLst>
+  </p:timing>
+</p:sld>
+</file>
+
+<file path=ppt/slides/slide10.xml><?xml version="1.0" encoding="utf-8"?>
+<p:sld xmlns:a="http://schemas.openxmlformats.org/drawingml/2006/main" xmlns:r="http://schemas.openxmlformats.org/officeDocument/2006/relationships" xmlns:p="http://schemas.openxmlformats.org/presentationml/2006/main">
+  <p:cSld>
+    <p:spTree>
+      <p:nvGrpSpPr>
+        <p:cNvPr id="1" name=""/>
+        <p:cNvGrpSpPr/>
+        <p:nvPr/>
+      </p:nvGrpSpPr>
+      <p:grpSpPr>
+        <a:xfrm>
+          <a:off x="0" y="0"/>
+          <a:ext cx="0" cy="0"/>
+          <a:chOff x="0" y="0"/>
+          <a:chExt cx="0" cy="0"/>
+        </a:xfrm>
+      </p:grpSpPr>
+      <p:sp>
+        <p:nvSpPr>
+          <p:cNvPr id="2" name="Title 1">
+            <a:extLst>
+              <a:ext uri="{FF2B5EF4-FFF2-40B4-BE49-F238E27FC236}">
+                <a16:creationId xmlns:a16="http://schemas.microsoft.com/office/drawing/2014/main" id="{AA256F39-4D68-49E9-B4CE-156B308762B1}"/>
+              </a:ext>
+            </a:extLst>
+          </p:cNvPr>
+          <p:cNvSpPr>
+            <a:spLocks noGrp="1"/>
+          </p:cNvSpPr>
+          <p:nvPr>
+            <p:ph type="title"/>
+          </p:nvPr>
+        </p:nvSpPr>
+        <p:spPr/>
+        <p:txBody>
+          <a:bodyPr/>
+          <a:lstStyle/>
+          <a:p>
+            <a:r>
+              <a:rPr lang="en-US" dirty="0"/>
+              <a:t>What’s Next</a:t>
+            </a:r>
+          </a:p>
+        </p:txBody>
+      </p:sp>
+      <p:sp>
+        <p:nvSpPr>
+          <p:cNvPr id="3" name="Content Placeholder 2">
+            <a:extLst>
+              <a:ext uri="{FF2B5EF4-FFF2-40B4-BE49-F238E27FC236}">
+                <a16:creationId xmlns:a16="http://schemas.microsoft.com/office/drawing/2014/main" id="{8D7B0C10-DE86-4C14-9CC6-74B04097BBA1}"/>
+              </a:ext>
+            </a:extLst>
+          </p:cNvPr>
+          <p:cNvSpPr>
+            <a:spLocks noGrp="1"/>
+          </p:cNvSpPr>
+          <p:nvPr>
+            <p:ph idx="1"/>
+          </p:nvPr>
+        </p:nvSpPr>
+        <p:spPr>
+          <a:xfrm>
+            <a:off x="677334" y="2160589"/>
+            <a:ext cx="4731007" cy="2556377"/>
+          </a:xfrm>
+        </p:spPr>
+        <p:txBody>
+          <a:bodyPr/>
+          <a:lstStyle/>
+          <a:p>
+            <a:r>
+              <a:rPr lang="en-US" dirty="0"/>
+              <a:t>Use user stories identified in this Sprint to complete backlog for the remainder of the semester</a:t>
+            </a:r>
+          </a:p>
+          <a:p>
+            <a:r>
+              <a:rPr lang="en-US" dirty="0"/>
+              <a:t>Begin development in previously created code base</a:t>
+            </a:r>
+          </a:p>
+          <a:p>
+            <a:r>
+              <a:rPr lang="en-US" dirty="0"/>
+              <a:t>Continue to utilize scrum</a:t>
+            </a:r>
+          </a:p>
+        </p:txBody>
+      </p:sp>
+      <p:pic>
+        <p:nvPicPr>
+          <p:cNvPr id="4" name="Audio 3">
+            <a:hlinkClick r:id="" action="ppaction://media"/>
+            <a:extLst>
+              <a:ext uri="{FF2B5EF4-FFF2-40B4-BE49-F238E27FC236}">
+                <a16:creationId xmlns:a16="http://schemas.microsoft.com/office/drawing/2014/main" id="{9002974E-0F1A-E844-BC4D-96A2C181408B}"/>
+              </a:ext>
+            </a:extLst>
+          </p:cNvPr>
+          <p:cNvPicPr>
+            <a:picLocks noChangeAspect="1"/>
+          </p:cNvPicPr>
+          <p:nvPr>
+            <a:audioFile r:link="rId2"/>
+            <p:extLst>
+              <p:ext uri="{DAA4B4D4-6D71-4841-9C94-3DE7FCFB9230}">
+                <p14:media xmlns:p14="http://schemas.microsoft.com/office/powerpoint/2010/main" r:embed="rId1"/>
+              </p:ext>
+            </p:extLst>
+          </p:nvPr>
+        </p:nvPicPr>
+        <p:blipFill>
+          <a:blip r:embed="rId4"/>
+          <a:stretch>
+            <a:fillRect/>
+          </a:stretch>
+        </p:blipFill>
+        <p:spPr>
+          <a:xfrm>
+            <a:off x="11226800" y="5892800"/>
+            <a:ext cx="812800" cy="812800"/>
+          </a:xfrm>
+          <a:prstGeom prst="rect">
+            <a:avLst/>
+          </a:prstGeom>
+        </p:spPr>
+      </p:pic>
+    </p:spTree>
+    <p:extLst>
+      <p:ext uri="{BB962C8B-B14F-4D97-AF65-F5344CB8AC3E}">
+        <p14:creationId xmlns:p14="http://schemas.microsoft.com/office/powerpoint/2010/main" val="3079119561"/>
+      </p:ext>
+    </p:extLst>
+  </p:cSld>
+  <p:clrMapOvr>
+    <a:masterClrMapping/>
+  </p:clrMapOvr>
+  <mc:AlternateContent xmlns:mc="http://schemas.openxmlformats.org/markup-compatibility/2006">
+    <mc:Choice xmlns:p14="http://schemas.microsoft.com/office/powerpoint/2010/main" Requires="p14">
+      <p:transition spd="slow" p14:dur="2000" advTm="47686"/>
+    </mc:Choice>
+    <mc:Fallback>
+      <p:transition spd="slow" advTm="47686"/>
+    </mc:Fallback>
+  </mc:AlternateContent>
+  <p:timing>
+    <p:tnLst>
+      <p:par>
+        <p:cTn id="1" dur="indefinite" restart="never" nodeType="tmRoot">
+          <p:childTnLst>
+            <p:seq concurrent="1" nextAc="seek">
+              <p:cTn id="2" dur="indefinite" nodeType="mainSeq">
+                <p:childTnLst>
+                  <p:par>
+                    <p:cTn id="3" fill="hold">
+                      <p:stCondLst>
+                        <p:cond delay="indefinite"/>
+                        <p:cond evt="onBegin" delay="0">
+                          <p:tn val="2"/>
+                        </p:cond>
+                      </p:stCondLst>
+                      <p:childTnLst>
+                        <p:par>
+                          <p:cTn id="4" fill="hold">
+                            <p:stCondLst>
+                              <p:cond delay="0"/>
+                            </p:stCondLst>
+                            <p:childTnLst>
+                              <p:par>
+                                <p:cTn id="5" presetID="1" presetClass="mediacall" presetSubtype="0" fill="hold" nodeType="afterEffect">
+                                  <p:stCondLst>
+                                    <p:cond delay="0"/>
+                                  </p:stCondLst>
+                                  <p:childTnLst>
+                                    <p:cmd type="call" cmd="playFrom(0.0)">
+                                      <p:cBhvr>
+                                        <p:cTn id="6" dur="1" fill="hold"/>
+                                        <p:tgtEl>
+                                          <p:spTgt spid="4"/>
+                                        </p:tgtEl>
+                                      </p:cBhvr>
+                                    </p:cmd>
+                                  </p:childTnLst>
+                                </p:cTn>
+                              </p:par>
+                            </p:childTnLst>
+                          </p:cTn>
+                        </p:par>
+                      </p:childTnLst>
+                    </p:cTn>
+                  </p:par>
+                </p:childTnLst>
+              </p:cTn>
+              <p:prevCondLst>
+                <p:cond evt="onPrev" delay="0">
+                  <p:tgtEl>
+                    <p:sldTgt/>
+                  </p:tgtEl>
+                </p:cond>
+              </p:prevCondLst>
+              <p:nextCondLst>
+                <p:cond evt="onNext" delay="0">
+                  <p:tgtEl>
+                    <p:sldTgt/>
+                  </p:tgtEl>
+                </p:cond>
+              </p:nextCondLst>
+            </p:seq>
+            <p:audio isNarration="1">
+              <p:cMediaNode vol="80000" showWhenStopped="0">
+                <p:cTn id="7" fill="hold" display="0">
+                  <p:stCondLst>
+                    <p:cond delay="indefinite"/>
+                  </p:stCondLst>
+                  <p:endCondLst>
+                    <p:cond evt="onStopAudio" delay="0">
+                      <p:tgtEl>
+                        <p:sldTgt/>
+                      </p:tgtEl>
+                    </p:cond>
+                  </p:endCondLst>
+                </p:cTn>
+                <p:tgtEl>
+                  <p:spTgt spid="4"/>
+                </p:tgtEl>
+              </p:cMediaNode>
+            </p:audio>
+          </p:childTnLst>
+        </p:cTn>
+      </p:par>
+    </p:tnLst>
+  </p:timing>
 </p:sld>
 </file>
 
@@ -5953,7 +6979,7 @@
           <a:p>
             <a:r>
               <a:rPr lang="en-US" dirty="0"/>
-              <a:t>Team Intro Slide</a:t>
+              <a:t>Team Intro</a:t>
             </a:r>
           </a:p>
         </p:txBody>
@@ -5976,38 +7002,32 @@
         </p:nvSpPr>
         <p:spPr/>
         <p:txBody>
-          <a:bodyPr/>
+          <a:bodyPr vert="horz" lIns="91440" tIns="45720" rIns="91440" bIns="45720" rtlCol="0" anchor="t">
+            <a:normAutofit/>
+          </a:bodyPr>
           <a:lstStyle/>
           <a:p>
             <a:r>
               <a:rPr lang="en-US" dirty="0"/>
-              <a:t>Nick Cunningham - _</a:t>
+              <a:t>Nick Cunningham – Future Embedded Systems Engineer</a:t>
             </a:r>
           </a:p>
           <a:p>
             <a:r>
               <a:rPr lang="en-US" dirty="0"/>
-              <a:t>Dakota Golightly - _</a:t>
+              <a:t>Dakota Golightly – Scrum Master</a:t>
             </a:r>
           </a:p>
           <a:p>
             <a:r>
               <a:rPr lang="en-US" dirty="0"/>
-              <a:t>Victor Mumford – Hopeful VR dev. </a:t>
+              <a:t>Victor Mumford – Hopeful VR Developer </a:t>
             </a:r>
           </a:p>
           <a:p>
             <a:r>
               <a:rPr lang="en-US" dirty="0"/>
-              <a:t>Sai </a:t>
-            </a:r>
-            <a:r>
-              <a:rPr lang="en-US" dirty="0" err="1"/>
-              <a:t>Donepudi</a:t>
-            </a:r>
-            <a:r>
-              <a:rPr lang="en-US" dirty="0"/>
-              <a:t> - _</a:t>
+              <a:t>Sai Donepudi – Aspiring Software Developer</a:t>
             </a:r>
           </a:p>
           <a:p>
@@ -6015,6 +7035,44 @@
           </a:p>
         </p:txBody>
       </p:sp>
+      <p:pic>
+        <p:nvPicPr>
+          <p:cNvPr id="4" name="Audio 3">
+            <a:hlinkClick r:id="" action="ppaction://media"/>
+            <a:extLst>
+              <a:ext uri="{FF2B5EF4-FFF2-40B4-BE49-F238E27FC236}">
+                <a16:creationId xmlns:a16="http://schemas.microsoft.com/office/drawing/2014/main" id="{8877C5E1-D89E-5A42-ADDF-B88F0E146F5F}"/>
+              </a:ext>
+            </a:extLst>
+          </p:cNvPr>
+          <p:cNvPicPr>
+            <a:picLocks noChangeAspect="1"/>
+          </p:cNvPicPr>
+          <p:nvPr>
+            <a:audioFile r:link="rId2"/>
+            <p:extLst>
+              <p:ext uri="{DAA4B4D4-6D71-4841-9C94-3DE7FCFB9230}">
+                <p14:media xmlns:p14="http://schemas.microsoft.com/office/powerpoint/2010/main" r:embed="rId1"/>
+              </p:ext>
+            </p:extLst>
+          </p:nvPr>
+        </p:nvPicPr>
+        <p:blipFill>
+          <a:blip r:embed="rId5"/>
+          <a:stretch>
+            <a:fillRect/>
+          </a:stretch>
+        </p:blipFill>
+        <p:spPr>
+          <a:xfrm>
+            <a:off x="11226800" y="5892800"/>
+            <a:ext cx="812800" cy="812800"/>
+          </a:xfrm>
+          <a:prstGeom prst="rect">
+            <a:avLst/>
+          </a:prstGeom>
+        </p:spPr>
+      </p:pic>
     </p:spTree>
     <p:extLst>
       <p:ext uri="{BB962C8B-B14F-4D97-AF65-F5344CB8AC3E}">
@@ -6025,6 +7083,101 @@
   <p:clrMapOvr>
     <a:masterClrMapping/>
   </p:clrMapOvr>
+  <mc:AlternateContent xmlns:mc="http://schemas.openxmlformats.org/markup-compatibility/2006">
+    <mc:Choice xmlns:p14="http://schemas.microsoft.com/office/powerpoint/2010/main" Requires="p14">
+      <p:transition spd="slow" p14:dur="2000" advTm="9621"/>
+    </mc:Choice>
+    <mc:Fallback>
+      <p:transition spd="slow" advTm="9621"/>
+    </mc:Fallback>
+  </mc:AlternateContent>
+  <p:timing>
+    <p:tnLst>
+      <p:par>
+        <p:cTn id="1" dur="indefinite" restart="never" nodeType="tmRoot">
+          <p:childTnLst>
+            <p:seq concurrent="1" nextAc="seek">
+              <p:cTn id="2" dur="indefinite" nodeType="mainSeq">
+                <p:childTnLst>
+                  <p:par>
+                    <p:cTn id="3" fill="hold">
+                      <p:stCondLst>
+                        <p:cond delay="indefinite"/>
+                        <p:cond evt="onBegin" delay="0">
+                          <p:tn val="2"/>
+                        </p:cond>
+                      </p:stCondLst>
+                      <p:childTnLst>
+                        <p:par>
+                          <p:cTn id="4" fill="hold">
+                            <p:stCondLst>
+                              <p:cond delay="0"/>
+                            </p:stCondLst>
+                            <p:childTnLst>
+                              <p:par>
+                                <p:cTn id="5" presetID="1" presetClass="mediacall" presetSubtype="0" fill="hold" nodeType="afterEffect">
+                                  <p:stCondLst>
+                                    <p:cond delay="0"/>
+                                  </p:stCondLst>
+                                  <p:childTnLst>
+                                    <p:cmd type="call" cmd="playFrom(0.0)">
+                                      <p:cBhvr>
+                                        <p:cTn id="6" dur="1" fill="hold"/>
+                                        <p:tgtEl>
+                                          <p:spTgt spid="4"/>
+                                        </p:tgtEl>
+                                      </p:cBhvr>
+                                    </p:cmd>
+                                  </p:childTnLst>
+                                </p:cTn>
+                              </p:par>
+                            </p:childTnLst>
+                          </p:cTn>
+                        </p:par>
+                      </p:childTnLst>
+                    </p:cTn>
+                  </p:par>
+                </p:childTnLst>
+              </p:cTn>
+              <p:prevCondLst>
+                <p:cond evt="onPrev" delay="0">
+                  <p:tgtEl>
+                    <p:sldTgt/>
+                  </p:tgtEl>
+                </p:cond>
+              </p:prevCondLst>
+              <p:nextCondLst>
+                <p:cond evt="onNext" delay="0">
+                  <p:tgtEl>
+                    <p:sldTgt/>
+                  </p:tgtEl>
+                </p:cond>
+              </p:nextCondLst>
+            </p:seq>
+            <p:audio isNarration="1">
+              <p:cMediaNode vol="80000" showWhenStopped="0">
+                <p:cTn id="7" fill="hold" display="0">
+                  <p:stCondLst>
+                    <p:cond delay="indefinite"/>
+                  </p:stCondLst>
+                  <p:endCondLst>
+                    <p:cond evt="onStopAudio" delay="0">
+                      <p:tgtEl>
+                        <p:sldTgt/>
+                      </p:tgtEl>
+                    </p:cond>
+                  </p:endCondLst>
+                </p:cTn>
+                <p:tgtEl>
+                  <p:spTgt spid="4"/>
+                </p:tgtEl>
+              </p:cMediaNode>
+            </p:audio>
+          </p:childTnLst>
+        </p:cTn>
+      </p:par>
+    </p:tnLst>
+  </p:timing>
 </p:sld>
 </file>
 
@@ -6050,7 +7203,7 @@
           <p:cNvPr id="2" name="Title 1">
             <a:extLst>
               <a:ext uri="{FF2B5EF4-FFF2-40B4-BE49-F238E27FC236}">
-                <a16:creationId xmlns:a16="http://schemas.microsoft.com/office/drawing/2014/main" id="{1D3B9969-65D6-48E5-8EC1-CA0ECF79E010}"/>
+                <a16:creationId xmlns:a16="http://schemas.microsoft.com/office/drawing/2014/main" id="{6290DBEE-2758-45C9-A074-8C328C5EBB77}"/>
               </a:ext>
             </a:extLst>
           </p:cNvPr>
@@ -6068,7 +7221,7 @@
           <a:p>
             <a:r>
               <a:rPr lang="en-US" dirty="0"/>
-              <a:t>Description of Omega Chess</a:t>
+              <a:t>Overview</a:t>
             </a:r>
           </a:p>
         </p:txBody>
@@ -6078,7 +7231,7 @@
           <p:cNvPr id="3" name="Content Placeholder 2">
             <a:extLst>
               <a:ext uri="{FF2B5EF4-FFF2-40B4-BE49-F238E27FC236}">
-                <a16:creationId xmlns:a16="http://schemas.microsoft.com/office/drawing/2014/main" id="{C587AEF0-2501-4B71-8D67-EB505D7D61AC}"/>
+                <a16:creationId xmlns:a16="http://schemas.microsoft.com/office/drawing/2014/main" id="{C967A623-4A44-4CC7-BB63-1443D4DA18E6}"/>
               </a:ext>
             </a:extLst>
           </p:cNvPr>
@@ -6091,68 +7244,213 @@
         </p:nvSpPr>
         <p:spPr/>
         <p:txBody>
-          <a:bodyPr/>
+          <a:bodyPr vert="horz" lIns="91440" tIns="45720" rIns="91440" bIns="45720" rtlCol="0" anchor="t">
+            <a:normAutofit/>
+          </a:bodyPr>
           <a:lstStyle/>
           <a:p>
             <a:r>
               <a:rPr lang="en-US" dirty="0"/>
-              <a:t>Omega Chess is much like standard chess, but with these key differences:</a:t>
+              <a:t>Description of Omega Chess</a:t>
+            </a:r>
+          </a:p>
+          <a:p>
+            <a:r>
+              <a:rPr lang="en-US" dirty="0"/>
+              <a:t>Project Progress</a:t>
             </a:r>
           </a:p>
           <a:p>
             <a:pPr lvl="1"/>
             <a:r>
               <a:rPr lang="en-US" dirty="0"/>
-              <a:t>The board is 9x9 (standard chess is 8x8), but also with four additional corner squares. </a:t>
+              <a:t>Summary</a:t>
             </a:r>
           </a:p>
           <a:p>
             <a:pPr lvl="1"/>
             <a:r>
               <a:rPr lang="en-US" dirty="0"/>
-              <a:t>There are two new units: the wizard, and the champion. </a:t>
-            </a:r>
-          </a:p>
-          <a:p>
-            <a:pPr lvl="2"/>
+              <a:t>User Stories Overview</a:t>
+            </a:r>
+          </a:p>
+          <a:p>
+            <a:pPr lvl="1"/>
             <a:r>
               <a:rPr lang="en-US" dirty="0"/>
-              <a:t>The wizard can either move to diagonal squares, or move in a 3x1 L shape, as opposed to the Knight’s 2x1 L. </a:t>
-            </a:r>
-          </a:p>
-          <a:p>
-            <a:pPr lvl="2"/>
+              <a:t>Class Diagram</a:t>
+            </a:r>
+          </a:p>
+          <a:p>
+            <a:pPr lvl="1"/>
             <a:r>
               <a:rPr lang="en-US" dirty="0"/>
-              <a:t>The champion can move 1-2 spaces in the cardinal directions, or exactly two spaces in the diagonal directions. </a:t>
+              <a:t>Kanban Board</a:t>
             </a:r>
           </a:p>
           <a:p>
             <a:pPr lvl="1"/>
             <a:r>
               <a:rPr lang="en-US" dirty="0"/>
-              <a:t>There are two of these new units per side. The Champions are put in the extra column spaces next to the Rooks, and the Wizards are put in the extra corner spaces. </a:t>
+              <a:t>Scrum Ceremony Output</a:t>
             </a:r>
           </a:p>
           <a:p>
             <a:pPr lvl="1"/>
-            <a:r>
-              <a:rPr lang="en-US" dirty="0"/>
-              <a:t>Pawns can move 1-3 spaces on their first turn. </a:t>
-            </a:r>
-          </a:p>
-        </p:txBody>
-      </p:sp>
+            <a:endParaRPr lang="en-US" dirty="0"/>
+          </a:p>
+          <a:p>
+            <a:pPr lvl="1"/>
+            <a:endParaRPr lang="en-US" dirty="0"/>
+          </a:p>
+          <a:p>
+            <a:endParaRPr lang="en-US" dirty="0"/>
+          </a:p>
+        </p:txBody>
+      </p:sp>
+      <p:pic>
+        <p:nvPicPr>
+          <p:cNvPr id="4" name="Audio 3">
+            <a:hlinkClick r:id="" action="ppaction://media"/>
+            <a:extLst>
+              <a:ext uri="{FF2B5EF4-FFF2-40B4-BE49-F238E27FC236}">
+                <a16:creationId xmlns:a16="http://schemas.microsoft.com/office/drawing/2014/main" id="{9A7D519E-CA76-4B40-8B25-D2BFE2619FA3}"/>
+              </a:ext>
+            </a:extLst>
+          </p:cNvPr>
+          <p:cNvPicPr>
+            <a:picLocks noChangeAspect="1"/>
+          </p:cNvPicPr>
+          <p:nvPr>
+            <a:audioFile r:link="rId2"/>
+            <p:extLst>
+              <p:ext uri="{DAA4B4D4-6D71-4841-9C94-3DE7FCFB9230}">
+                <p14:media xmlns:p14="http://schemas.microsoft.com/office/powerpoint/2010/main" r:embed="rId1"/>
+              </p:ext>
+            </p:extLst>
+          </p:nvPr>
+        </p:nvPicPr>
+        <p:blipFill>
+          <a:blip r:embed="rId4"/>
+          <a:stretch>
+            <a:fillRect/>
+          </a:stretch>
+        </p:blipFill>
+        <p:spPr>
+          <a:xfrm>
+            <a:off x="11226800" y="5892800"/>
+            <a:ext cx="812800" cy="812800"/>
+          </a:xfrm>
+          <a:prstGeom prst="rect">
+            <a:avLst/>
+          </a:prstGeom>
+        </p:spPr>
+      </p:pic>
     </p:spTree>
     <p:extLst>
       <p:ext uri="{BB962C8B-B14F-4D97-AF65-F5344CB8AC3E}">
-        <p14:creationId xmlns:p14="http://schemas.microsoft.com/office/powerpoint/2010/main" val="1028159980"/>
+        <p14:creationId xmlns:p14="http://schemas.microsoft.com/office/powerpoint/2010/main" val="1872409855"/>
       </p:ext>
     </p:extLst>
   </p:cSld>
   <p:clrMapOvr>
     <a:masterClrMapping/>
   </p:clrMapOvr>
+  <mc:AlternateContent xmlns:mc="http://schemas.openxmlformats.org/markup-compatibility/2006">
+    <mc:Choice xmlns:p14="http://schemas.microsoft.com/office/powerpoint/2010/main" Requires="p14">
+      <p:transition spd="slow" p14:dur="2000" advTm="19515"/>
+    </mc:Choice>
+    <mc:Fallback>
+      <p:transition spd="slow" advTm="19515"/>
+    </mc:Fallback>
+  </mc:AlternateContent>
+  <p:timing>
+    <p:tnLst>
+      <p:par>
+        <p:cTn id="1" dur="indefinite" restart="never" nodeType="tmRoot">
+          <p:childTnLst>
+            <p:seq concurrent="1" nextAc="seek">
+              <p:cTn id="2" dur="indefinite" nodeType="mainSeq">
+                <p:childTnLst>
+                  <p:par>
+                    <p:cTn id="3" fill="hold">
+                      <p:stCondLst>
+                        <p:cond delay="indefinite"/>
+                        <p:cond evt="onBegin" delay="0">
+                          <p:tn val="2"/>
+                        </p:cond>
+                      </p:stCondLst>
+                      <p:childTnLst>
+                        <p:par>
+                          <p:cTn id="4" fill="hold">
+                            <p:stCondLst>
+                              <p:cond delay="0"/>
+                            </p:stCondLst>
+                            <p:childTnLst>
+                              <p:par>
+                                <p:cTn id="5" presetID="1" presetClass="mediacall" presetSubtype="0" fill="hold" nodeType="afterEffect">
+                                  <p:stCondLst>
+                                    <p:cond delay="0"/>
+                                  </p:stCondLst>
+                                  <p:childTnLst>
+                                    <p:cmd type="call" cmd="playFrom(0.0)">
+                                      <p:cBhvr>
+                                        <p:cTn id="6" dur="1" fill="hold"/>
+                                        <p:tgtEl>
+                                          <p:spTgt spid="4"/>
+                                        </p:tgtEl>
+                                      </p:cBhvr>
+                                    </p:cmd>
+                                  </p:childTnLst>
+                                </p:cTn>
+                              </p:par>
+                            </p:childTnLst>
+                          </p:cTn>
+                        </p:par>
+                      </p:childTnLst>
+                    </p:cTn>
+                  </p:par>
+                </p:childTnLst>
+              </p:cTn>
+              <p:prevCondLst>
+                <p:cond evt="onPrev" delay="0">
+                  <p:tgtEl>
+                    <p:sldTgt/>
+                  </p:tgtEl>
+                </p:cond>
+              </p:prevCondLst>
+              <p:nextCondLst>
+                <p:cond evt="onNext" delay="0">
+                  <p:tgtEl>
+                    <p:sldTgt/>
+                  </p:tgtEl>
+                </p:cond>
+              </p:nextCondLst>
+            </p:seq>
+            <p:audio isNarration="1">
+              <p:cMediaNode vol="80000" showWhenStopped="0">
+                <p:cTn id="7" fill="hold" display="0">
+                  <p:stCondLst>
+                    <p:cond delay="indefinite"/>
+                  </p:stCondLst>
+                  <p:endCondLst>
+                    <p:cond evt="onStopAudio" delay="0">
+                      <p:tgtEl>
+                        <p:sldTgt/>
+                      </p:tgtEl>
+                    </p:cond>
+                  </p:endCondLst>
+                </p:cTn>
+                <p:tgtEl>
+                  <p:spTgt spid="4"/>
+                </p:tgtEl>
+              </p:cMediaNode>
+            </p:audio>
+          </p:childTnLst>
+        </p:cTn>
+      </p:par>
+    </p:tnLst>
+  </p:timing>
 </p:sld>
 </file>
 
@@ -6178,7 +7476,7 @@
           <p:cNvPr id="2" name="Title 1">
             <a:extLst>
               <a:ext uri="{FF2B5EF4-FFF2-40B4-BE49-F238E27FC236}">
-                <a16:creationId xmlns:a16="http://schemas.microsoft.com/office/drawing/2014/main" id="{C1A1D012-8248-415C-853F-B18A01796DF6}"/>
+                <a16:creationId xmlns:a16="http://schemas.microsoft.com/office/drawing/2014/main" id="{1D3B9969-65D6-48E5-8EC1-CA0ECF79E010}"/>
               </a:ext>
             </a:extLst>
           </p:cNvPr>
@@ -6196,7 +7494,7 @@
           <a:p>
             <a:r>
               <a:rPr lang="en-US" dirty="0"/>
-              <a:t>Slide for User Stories</a:t>
+              <a:t>Description of Omega Chess</a:t>
             </a:r>
           </a:p>
         </p:txBody>
@@ -6206,7 +7504,7 @@
           <p:cNvPr id="3" name="Content Placeholder 2">
             <a:extLst>
               <a:ext uri="{FF2B5EF4-FFF2-40B4-BE49-F238E27FC236}">
-                <a16:creationId xmlns:a16="http://schemas.microsoft.com/office/drawing/2014/main" id="{76115884-0744-4B95-B663-1DF90B2CAD6D}"/>
+                <a16:creationId xmlns:a16="http://schemas.microsoft.com/office/drawing/2014/main" id="{C587AEF0-2501-4B71-8D67-EB505D7D61AC}"/>
               </a:ext>
             </a:extLst>
           </p:cNvPr>
@@ -6219,33 +7517,66 @@
         </p:nvSpPr>
         <p:spPr/>
         <p:txBody>
-          <a:bodyPr/>
+          <a:bodyPr vert="horz" lIns="91440" tIns="45720" rIns="91440" bIns="45720" rtlCol="0" anchor="t">
+            <a:normAutofit/>
+          </a:bodyPr>
           <a:lstStyle/>
           <a:p>
             <a:r>
               <a:rPr lang="en-US" dirty="0"/>
-              <a:t>The stories we created fell into 5 Epics: Registration, Matchmaking, Player History, Game Shell, and Gameplay. </a:t>
-            </a:r>
-          </a:p>
-          <a:p>
+              <a:t>Omega Chess is much like standard chess, but with these key differences:</a:t>
+            </a:r>
+          </a:p>
+          <a:p>
+            <a:pPr lvl="1"/>
             <a:r>
               <a:rPr lang="en-US" dirty="0"/>
-              <a:t>Stories were prioritized according to Must/Should/Could/Would</a:t>
-            </a:r>
-            <a:r>
-              <a:rPr lang="en-US"/>
-              <a:t>. </a:t>
-            </a:r>
-            <a:endParaRPr lang="en-US" dirty="0"/>
+              <a:t>The board is 10x10 (standard chess is 8x8), but also with four additional corner squares. </a:t>
+            </a:r>
+          </a:p>
+          <a:p>
+            <a:pPr lvl="1"/>
+            <a:r>
+              <a:rPr lang="en-US" dirty="0"/>
+              <a:t>There are two new units: the wizard, and the champion. </a:t>
+            </a:r>
+          </a:p>
+          <a:p>
+            <a:pPr lvl="2"/>
+            <a:r>
+              <a:rPr lang="en-US" dirty="0"/>
+              <a:t>The wizard can either move to diagonal squares, or move in a 3x1 L shape, much like the Knight’s 2x1 L. </a:t>
+            </a:r>
+          </a:p>
+          <a:p>
+            <a:pPr lvl="2"/>
+            <a:r>
+              <a:rPr lang="en-US" dirty="0"/>
+              <a:t>The champion can move 1-2 spaces in the cardinal directions, or exactly two spaces in the diagonal directions. </a:t>
+            </a:r>
+          </a:p>
+          <a:p>
+            <a:pPr lvl="1"/>
+            <a:r>
+              <a:rPr lang="en-US" dirty="0"/>
+              <a:t>There are two of these new units per side. The Champions are put in the extra column spaces next to the Rooks, and the Wizards are put in the extra corner spaces. </a:t>
+            </a:r>
+          </a:p>
+          <a:p>
+            <a:pPr lvl="1"/>
+            <a:r>
+              <a:rPr lang="en-US" dirty="0"/>
+              <a:t>Pawns can move 1-3 spaces forward on their first turn instead of 1-2 spaces.</a:t>
+            </a:r>
           </a:p>
         </p:txBody>
       </p:sp>
       <p:pic>
         <p:nvPicPr>
-          <p:cNvPr id="5" name="Picture 4">
+          <p:cNvPr id="4" name="Picture 4" descr="A picture of an Omega chess board in the starting position.&#10;">
             <a:extLst>
               <a:ext uri="{FF2B5EF4-FFF2-40B4-BE49-F238E27FC236}">
-                <a16:creationId xmlns:a16="http://schemas.microsoft.com/office/drawing/2014/main" id="{A59B25FB-A856-409A-827C-1A2E666E0463}"/>
+                <a16:creationId xmlns:a16="http://schemas.microsoft.com/office/drawing/2014/main" id="{4BC95066-3AB6-4987-81D7-7A17A38ADCCE}"/>
               </a:ext>
             </a:extLst>
           </p:cNvPr>
@@ -6255,15 +7586,98 @@
           <p:nvPr/>
         </p:nvPicPr>
         <p:blipFill>
-          <a:blip r:embed="rId2"/>
+          <a:blip r:embed="rId5"/>
           <a:stretch>
             <a:fillRect/>
           </a:stretch>
         </p:blipFill>
         <p:spPr>
           <a:xfrm>
-            <a:off x="7920856" y="2662130"/>
-            <a:ext cx="3505689" cy="1533739"/>
+            <a:off x="9275954" y="2345074"/>
+            <a:ext cx="2314575" cy="2552700"/>
+          </a:xfrm>
+          <a:prstGeom prst="rect">
+            <a:avLst/>
+          </a:prstGeom>
+        </p:spPr>
+      </p:pic>
+      <p:sp>
+        <p:nvSpPr>
+          <p:cNvPr id="5" name="TextBox 4">
+            <a:extLst>
+              <a:ext uri="{FF2B5EF4-FFF2-40B4-BE49-F238E27FC236}">
+                <a16:creationId xmlns:a16="http://schemas.microsoft.com/office/drawing/2014/main" id="{20F7F971-2804-4CC7-BB11-427C890764A2}"/>
+              </a:ext>
+            </a:extLst>
+          </p:cNvPr>
+          <p:cNvSpPr txBox="1"/>
+          <p:nvPr/>
+        </p:nvSpPr>
+        <p:spPr>
+          <a:xfrm>
+            <a:off x="9441085" y="6672804"/>
+            <a:ext cx="2974692" cy="184666"/>
+          </a:xfrm>
+          <a:prstGeom prst="rect">
+            <a:avLst/>
+          </a:prstGeom>
+          <a:noFill/>
+        </p:spPr>
+        <p:txBody>
+          <a:bodyPr rot="0" spcFirstLastPara="0" vertOverflow="overflow" horzOverflow="overflow" vert="horz" wrap="square" lIns="91440" tIns="45720" rIns="91440" bIns="45720" numCol="1" spcCol="0" rtlCol="0" fromWordArt="0" anchor="t" anchorCtr="0" forceAA="0" compatLnSpc="1">
+            <a:prstTxWarp prst="textNoShape">
+              <a:avLst/>
+            </a:prstTxWarp>
+            <a:spAutoFit/>
+          </a:bodyPr>
+          <a:lstStyle/>
+          <a:p>
+            <a:r>
+              <a:rPr lang="en-US" sz="600" dirty="0"/>
+              <a:t>Image source: </a:t>
+            </a:r>
+            <a:r>
+              <a:rPr lang="en-US" sz="600" dirty="0">
+                <a:ea typeface="+mn-lt"/>
+                <a:cs typeface="+mn-lt"/>
+              </a:rPr>
+              <a:t>https://www.chessvariants.com/large.dir/omega/rules.html</a:t>
+            </a:r>
+          </a:p>
+        </p:txBody>
+      </p:sp>
+      <p:pic>
+        <p:nvPicPr>
+          <p:cNvPr id="6" name="Audio 5">
+            <a:hlinkClick r:id="" action="ppaction://media"/>
+            <a:extLst>
+              <a:ext uri="{FF2B5EF4-FFF2-40B4-BE49-F238E27FC236}">
+                <a16:creationId xmlns:a16="http://schemas.microsoft.com/office/drawing/2014/main" id="{41CA9ECA-7B14-944B-B755-9C805AA2CCFD}"/>
+              </a:ext>
+            </a:extLst>
+          </p:cNvPr>
+          <p:cNvPicPr>
+            <a:picLocks noChangeAspect="1"/>
+          </p:cNvPicPr>
+          <p:nvPr>
+            <a:audioFile r:link="rId2"/>
+            <p:extLst>
+              <p:ext uri="{DAA4B4D4-6D71-4841-9C94-3DE7FCFB9230}">
+                <p14:media xmlns:p14="http://schemas.microsoft.com/office/powerpoint/2010/main" r:embed="rId1"/>
+              </p:ext>
+            </p:extLst>
+          </p:nvPr>
+        </p:nvPicPr>
+        <p:blipFill>
+          <a:blip r:embed="rId6"/>
+          <a:stretch>
+            <a:fillRect/>
+          </a:stretch>
+        </p:blipFill>
+        <p:spPr>
+          <a:xfrm>
+            <a:off x="11226800" y="5892800"/>
+            <a:ext cx="812800" cy="812800"/>
           </a:xfrm>
           <a:prstGeom prst="rect">
             <a:avLst/>
@@ -6273,13 +7687,108 @@
     </p:spTree>
     <p:extLst>
       <p:ext uri="{BB962C8B-B14F-4D97-AF65-F5344CB8AC3E}">
-        <p14:creationId xmlns:p14="http://schemas.microsoft.com/office/powerpoint/2010/main" val="2584131161"/>
+        <p14:creationId xmlns:p14="http://schemas.microsoft.com/office/powerpoint/2010/main" val="1028159980"/>
       </p:ext>
     </p:extLst>
   </p:cSld>
   <p:clrMapOvr>
     <a:masterClrMapping/>
   </p:clrMapOvr>
+  <mc:AlternateContent xmlns:mc="http://schemas.openxmlformats.org/markup-compatibility/2006">
+    <mc:Choice xmlns:p14="http://schemas.microsoft.com/office/powerpoint/2010/main" Requires="p14">
+      <p:transition spd="slow" p14:dur="2000" advTm="112076"/>
+    </mc:Choice>
+    <mc:Fallback>
+      <p:transition spd="slow" advTm="112076"/>
+    </mc:Fallback>
+  </mc:AlternateContent>
+  <p:timing>
+    <p:tnLst>
+      <p:par>
+        <p:cTn id="1" dur="indefinite" restart="never" nodeType="tmRoot">
+          <p:childTnLst>
+            <p:seq concurrent="1" nextAc="seek">
+              <p:cTn id="2" dur="indefinite" nodeType="mainSeq">
+                <p:childTnLst>
+                  <p:par>
+                    <p:cTn id="3" fill="hold">
+                      <p:stCondLst>
+                        <p:cond delay="indefinite"/>
+                        <p:cond evt="onBegin" delay="0">
+                          <p:tn val="2"/>
+                        </p:cond>
+                      </p:stCondLst>
+                      <p:childTnLst>
+                        <p:par>
+                          <p:cTn id="4" fill="hold">
+                            <p:stCondLst>
+                              <p:cond delay="0"/>
+                            </p:stCondLst>
+                            <p:childTnLst>
+                              <p:par>
+                                <p:cTn id="5" presetID="1" presetClass="mediacall" presetSubtype="0" fill="hold" nodeType="afterEffect">
+                                  <p:stCondLst>
+                                    <p:cond delay="0"/>
+                                  </p:stCondLst>
+                                  <p:childTnLst>
+                                    <p:cmd type="call" cmd="playFrom(0.0)">
+                                      <p:cBhvr>
+                                        <p:cTn id="6" dur="1" fill="hold"/>
+                                        <p:tgtEl>
+                                          <p:spTgt spid="6"/>
+                                        </p:tgtEl>
+                                      </p:cBhvr>
+                                    </p:cmd>
+                                  </p:childTnLst>
+                                </p:cTn>
+                              </p:par>
+                            </p:childTnLst>
+                          </p:cTn>
+                        </p:par>
+                      </p:childTnLst>
+                    </p:cTn>
+                  </p:par>
+                </p:childTnLst>
+              </p:cTn>
+              <p:prevCondLst>
+                <p:cond evt="onPrev" delay="0">
+                  <p:tgtEl>
+                    <p:sldTgt/>
+                  </p:tgtEl>
+                </p:cond>
+              </p:prevCondLst>
+              <p:nextCondLst>
+                <p:cond evt="onNext" delay="0">
+                  <p:tgtEl>
+                    <p:sldTgt/>
+                  </p:tgtEl>
+                </p:cond>
+              </p:nextCondLst>
+            </p:seq>
+            <p:audio isNarration="1">
+              <p:cMediaNode vol="80000" showWhenStopped="0">
+                <p:cTn id="7" fill="hold" display="0">
+                  <p:stCondLst>
+                    <p:cond delay="indefinite"/>
+                  </p:stCondLst>
+                  <p:endCondLst>
+                    <p:cond evt="onStopAudio" delay="0">
+                      <p:tgtEl>
+                        <p:sldTgt/>
+                      </p:tgtEl>
+                    </p:cond>
+                  </p:endCondLst>
+                </p:cTn>
+                <p:tgtEl>
+                  <p:spTgt spid="6"/>
+                </p:tgtEl>
+              </p:cMediaNode>
+            </p:audio>
+          </p:childTnLst>
+        </p:cTn>
+      </p:par>
+    </p:tnLst>
+  </p:timing>
 </p:sld>
 </file>
 
@@ -6305,7 +7814,7 @@
           <p:cNvPr id="2" name="Title 1">
             <a:extLst>
               <a:ext uri="{FF2B5EF4-FFF2-40B4-BE49-F238E27FC236}">
-                <a16:creationId xmlns:a16="http://schemas.microsoft.com/office/drawing/2014/main" id="{FAC95A89-10CD-4AF6-8A54-291FEB82B515}"/>
+                <a16:creationId xmlns:a16="http://schemas.microsoft.com/office/drawing/2014/main" id="{C1A1D012-8248-415C-853F-B18A01796DF6}"/>
               </a:ext>
             </a:extLst>
           </p:cNvPr>
@@ -6316,48 +7825,148 @@
             <p:ph type="title"/>
           </p:nvPr>
         </p:nvSpPr>
-        <p:spPr/>
+        <p:spPr>
+          <a:xfrm>
+            <a:off x="677334" y="609600"/>
+            <a:ext cx="8596668" cy="752856"/>
+          </a:xfrm>
+        </p:spPr>
         <p:txBody>
           <a:bodyPr/>
           <a:lstStyle/>
           <a:p>
             <a:r>
               <a:rPr lang="en-US" dirty="0"/>
-              <a:t>Class Diagrams</a:t>
-            </a:r>
+              <a:t>Project Progress</a:t>
+            </a:r>
+          </a:p>
+        </p:txBody>
+      </p:sp>
+      <p:sp>
+        <p:nvSpPr>
+          <p:cNvPr id="3" name="Content Placeholder 2">
+            <a:extLst>
+              <a:ext uri="{FF2B5EF4-FFF2-40B4-BE49-F238E27FC236}">
+                <a16:creationId xmlns:a16="http://schemas.microsoft.com/office/drawing/2014/main" id="{76115884-0744-4B95-B663-1DF90B2CAD6D}"/>
+              </a:ext>
+            </a:extLst>
+          </p:cNvPr>
+          <p:cNvSpPr>
+            <a:spLocks noGrp="1"/>
+          </p:cNvSpPr>
+          <p:nvPr>
+            <p:ph idx="1"/>
+          </p:nvPr>
+        </p:nvSpPr>
+        <p:spPr>
+          <a:xfrm>
+            <a:off x="677334" y="1749109"/>
+            <a:ext cx="8596668" cy="3316667"/>
+          </a:xfrm>
+        </p:spPr>
+        <p:txBody>
+          <a:bodyPr>
+            <a:normAutofit/>
+          </a:bodyPr>
+          <a:lstStyle/>
+          <a:p>
+            <a:r>
+              <a:rPr lang="en-US" dirty="0"/>
+              <a:t>P1 was mostly about project setup and planning</a:t>
+            </a:r>
+          </a:p>
+          <a:p>
+            <a:r>
+              <a:rPr lang="en-US" dirty="0"/>
+              <a:t>Implemented Scrum methodology for development</a:t>
+            </a:r>
+          </a:p>
+          <a:p>
+            <a:r>
+              <a:rPr lang="en-US" dirty="0"/>
+              <a:t>Deliverables</a:t>
+            </a:r>
+          </a:p>
+          <a:p>
+            <a:pPr lvl="1"/>
+            <a:r>
+              <a:rPr lang="en-US" dirty="0"/>
+              <a:t>User stories and tasks</a:t>
+            </a:r>
+          </a:p>
+          <a:p>
+            <a:pPr lvl="1"/>
+            <a:r>
+              <a:rPr lang="en-US" dirty="0"/>
+              <a:t>Kanban board</a:t>
+            </a:r>
+          </a:p>
+          <a:p>
+            <a:pPr lvl="1"/>
+            <a:r>
+              <a:rPr lang="en-US" dirty="0"/>
+              <a:t>Class diagram and CRC cards</a:t>
+            </a:r>
+          </a:p>
+          <a:p>
+            <a:pPr lvl="1"/>
+            <a:r>
+              <a:rPr lang="en-US" dirty="0"/>
+              <a:t>Output of Scrum ceremonies</a:t>
+            </a:r>
+          </a:p>
+          <a:p>
+            <a:r>
+              <a:rPr lang="en-US" dirty="0"/>
+              <a:t>Implemented code base utilizing Spring Boot/Maven and React</a:t>
+            </a:r>
+          </a:p>
+          <a:p>
+            <a:pPr lvl="1"/>
+            <a:endParaRPr lang="en-US" dirty="0"/>
+          </a:p>
+          <a:p>
+            <a:pPr lvl="1"/>
+            <a:endParaRPr lang="en-US" dirty="0"/>
+          </a:p>
+          <a:p>
+            <a:pPr lvl="2"/>
+            <a:endParaRPr lang="en-US" dirty="0"/>
           </a:p>
         </p:txBody>
       </p:sp>
       <p:pic>
         <p:nvPicPr>
-          <p:cNvPr id="5" name="Picture 4" descr="Diagram, schematic&#10;&#10;Description automatically generated">
+          <p:cNvPr id="6" name="Audio 5">
+            <a:hlinkClick r:id="" action="ppaction://media"/>
             <a:extLst>
               <a:ext uri="{FF2B5EF4-FFF2-40B4-BE49-F238E27FC236}">
-                <a16:creationId xmlns:a16="http://schemas.microsoft.com/office/drawing/2014/main" id="{3291A60D-BAF6-4F5C-A9F2-5F4881EE04BB}"/>
+                <a16:creationId xmlns:a16="http://schemas.microsoft.com/office/drawing/2014/main" id="{8CDC9DF0-760F-9242-9EC0-A457C1010E0F}"/>
               </a:ext>
             </a:extLst>
           </p:cNvPr>
           <p:cNvPicPr>
             <a:picLocks noChangeAspect="1"/>
           </p:cNvPicPr>
-          <p:nvPr/>
+          <p:nvPr>
+            <a:audioFile r:link="rId2"/>
+            <p:extLst>
+              <p:ext uri="{DAA4B4D4-6D71-4841-9C94-3DE7FCFB9230}">
+                <p14:media xmlns:p14="http://schemas.microsoft.com/office/powerpoint/2010/main" r:embed="rId1"/>
+              </p:ext>
+            </p:extLst>
+          </p:nvPr>
         </p:nvPicPr>
         <p:blipFill>
-          <a:blip r:embed="rId2">
-            <a:extLst>
-              <a:ext uri="{28A0092B-C50C-407E-A947-70E740481C1C}">
-                <a14:useLocalDpi xmlns:a14="http://schemas.microsoft.com/office/drawing/2010/main" val="0"/>
-              </a:ext>
-            </a:extLst>
-          </a:blip>
+          <a:blip r:embed="rId4"/>
           <a:stretch>
             <a:fillRect/>
           </a:stretch>
         </p:blipFill>
         <p:spPr>
           <a:xfrm>
-            <a:off x="5797877" y="0"/>
-            <a:ext cx="6394123" cy="6858000"/>
+            <a:off x="11226800" y="5892800"/>
+            <a:ext cx="812800" cy="812800"/>
           </a:xfrm>
           <a:prstGeom prst="rect">
             <a:avLst/>
@@ -6367,13 +7976,108 @@
     </p:spTree>
     <p:extLst>
       <p:ext uri="{BB962C8B-B14F-4D97-AF65-F5344CB8AC3E}">
-        <p14:creationId xmlns:p14="http://schemas.microsoft.com/office/powerpoint/2010/main" val="2177716728"/>
+        <p14:creationId xmlns:p14="http://schemas.microsoft.com/office/powerpoint/2010/main" val="2584131161"/>
       </p:ext>
     </p:extLst>
   </p:cSld>
   <p:clrMapOvr>
     <a:masterClrMapping/>
   </p:clrMapOvr>
+  <mc:AlternateContent xmlns:mc="http://schemas.openxmlformats.org/markup-compatibility/2006">
+    <mc:Choice xmlns:p14="http://schemas.microsoft.com/office/powerpoint/2010/main" Requires="p14">
+      <p:transition spd="slow" p14:dur="2000" advTm="49833"/>
+    </mc:Choice>
+    <mc:Fallback>
+      <p:transition spd="slow" advTm="49833"/>
+    </mc:Fallback>
+  </mc:AlternateContent>
+  <p:timing>
+    <p:tnLst>
+      <p:par>
+        <p:cTn id="1" dur="indefinite" restart="never" nodeType="tmRoot">
+          <p:childTnLst>
+            <p:seq concurrent="1" nextAc="seek">
+              <p:cTn id="2" dur="indefinite" nodeType="mainSeq">
+                <p:childTnLst>
+                  <p:par>
+                    <p:cTn id="3" fill="hold">
+                      <p:stCondLst>
+                        <p:cond delay="indefinite"/>
+                        <p:cond evt="onBegin" delay="0">
+                          <p:tn val="2"/>
+                        </p:cond>
+                      </p:stCondLst>
+                      <p:childTnLst>
+                        <p:par>
+                          <p:cTn id="4" fill="hold">
+                            <p:stCondLst>
+                              <p:cond delay="0"/>
+                            </p:stCondLst>
+                            <p:childTnLst>
+                              <p:par>
+                                <p:cTn id="5" presetID="1" presetClass="mediacall" presetSubtype="0" fill="hold" nodeType="afterEffect">
+                                  <p:stCondLst>
+                                    <p:cond delay="0"/>
+                                  </p:stCondLst>
+                                  <p:childTnLst>
+                                    <p:cmd type="call" cmd="playFrom(0.0)">
+                                      <p:cBhvr>
+                                        <p:cTn id="6" dur="1" fill="hold"/>
+                                        <p:tgtEl>
+                                          <p:spTgt spid="6"/>
+                                        </p:tgtEl>
+                                      </p:cBhvr>
+                                    </p:cmd>
+                                  </p:childTnLst>
+                                </p:cTn>
+                              </p:par>
+                            </p:childTnLst>
+                          </p:cTn>
+                        </p:par>
+                      </p:childTnLst>
+                    </p:cTn>
+                  </p:par>
+                </p:childTnLst>
+              </p:cTn>
+              <p:prevCondLst>
+                <p:cond evt="onPrev" delay="0">
+                  <p:tgtEl>
+                    <p:sldTgt/>
+                  </p:tgtEl>
+                </p:cond>
+              </p:prevCondLst>
+              <p:nextCondLst>
+                <p:cond evt="onNext" delay="0">
+                  <p:tgtEl>
+                    <p:sldTgt/>
+                  </p:tgtEl>
+                </p:cond>
+              </p:nextCondLst>
+            </p:seq>
+            <p:audio isNarration="1">
+              <p:cMediaNode vol="80000" showWhenStopped="0">
+                <p:cTn id="7" fill="hold" display="0">
+                  <p:stCondLst>
+                    <p:cond delay="indefinite"/>
+                  </p:stCondLst>
+                  <p:endCondLst>
+                    <p:cond evt="onStopAudio" delay="0">
+                      <p:tgtEl>
+                        <p:sldTgt/>
+                      </p:tgtEl>
+                    </p:cond>
+                  </p:endCondLst>
+                </p:cTn>
+                <p:tgtEl>
+                  <p:spTgt spid="6"/>
+                </p:tgtEl>
+              </p:cMediaNode>
+            </p:audio>
+          </p:childTnLst>
+        </p:cTn>
+      </p:par>
+    </p:tnLst>
+  </p:timing>
 </p:sld>
 </file>
 
@@ -6399,7 +8103,7 @@
           <p:cNvPr id="2" name="Title 1">
             <a:extLst>
               <a:ext uri="{FF2B5EF4-FFF2-40B4-BE49-F238E27FC236}">
-                <a16:creationId xmlns:a16="http://schemas.microsoft.com/office/drawing/2014/main" id="{CA27DF44-574C-4B20-ADD7-9BFC782C7CE9}"/>
+                <a16:creationId xmlns:a16="http://schemas.microsoft.com/office/drawing/2014/main" id="{C1A1D012-8248-415C-853F-B18A01796DF6}"/>
               </a:ext>
             </a:extLst>
           </p:cNvPr>
@@ -6410,63 +8114,440 @@
             <p:ph type="title"/>
           </p:nvPr>
         </p:nvSpPr>
-        <p:spPr/>
+        <p:spPr>
+          <a:xfrm>
+            <a:off x="677334" y="609600"/>
+            <a:ext cx="8596668" cy="752856"/>
+          </a:xfrm>
+        </p:spPr>
         <p:txBody>
           <a:bodyPr/>
           <a:lstStyle/>
           <a:p>
             <a:r>
               <a:rPr lang="en-US" dirty="0"/>
-              <a:t>Kanban board</a:t>
-            </a:r>
+              <a:t>User Stories</a:t>
+            </a:r>
+          </a:p>
+        </p:txBody>
+      </p:sp>
+      <p:sp>
+        <p:nvSpPr>
+          <p:cNvPr id="3" name="Content Placeholder 2">
+            <a:extLst>
+              <a:ext uri="{FF2B5EF4-FFF2-40B4-BE49-F238E27FC236}">
+                <a16:creationId xmlns:a16="http://schemas.microsoft.com/office/drawing/2014/main" id="{76115884-0744-4B95-B663-1DF90B2CAD6D}"/>
+              </a:ext>
+            </a:extLst>
+          </p:cNvPr>
+          <p:cNvSpPr>
+            <a:spLocks noGrp="1"/>
+          </p:cNvSpPr>
+          <p:nvPr>
+            <p:ph idx="1"/>
+          </p:nvPr>
+        </p:nvSpPr>
+        <p:spPr>
+          <a:xfrm>
+            <a:off x="677334" y="1749109"/>
+            <a:ext cx="8596668" cy="4404803"/>
+          </a:xfrm>
+        </p:spPr>
+        <p:txBody>
+          <a:bodyPr>
+            <a:normAutofit/>
+          </a:bodyPr>
+          <a:lstStyle/>
+          <a:p>
+            <a:r>
+              <a:rPr lang="en-US" dirty="0"/>
+              <a:t>User stories were created from the transcript provided in the P1 brief and discussions with the Product Owner</a:t>
+            </a:r>
+          </a:p>
+          <a:p>
+            <a:r>
+              <a:rPr lang="en-US" dirty="0"/>
+              <a:t>User Stories</a:t>
+            </a:r>
+          </a:p>
+          <a:p>
+            <a:pPr lvl="1"/>
+            <a:r>
+              <a:rPr lang="en-US" dirty="0"/>
+              <a:t>“As a user, I would like to be able to”:</a:t>
+            </a:r>
+          </a:p>
+          <a:p>
+            <a:pPr lvl="2"/>
+            <a:r>
+              <a:rPr lang="en-US" dirty="0"/>
+              <a:t>Register for an account</a:t>
+            </a:r>
+          </a:p>
+          <a:p>
+            <a:pPr lvl="2"/>
+            <a:r>
+              <a:rPr lang="en-US" dirty="0"/>
+              <a:t>Login to my account</a:t>
+            </a:r>
+          </a:p>
+          <a:p>
+            <a:pPr lvl="2"/>
+            <a:r>
+              <a:rPr lang="en-US" dirty="0"/>
+              <a:t>Create a new match</a:t>
+            </a:r>
+          </a:p>
+          <a:p>
+            <a:pPr lvl="2"/>
+            <a:r>
+              <a:rPr lang="en-US" dirty="0"/>
+              <a:t>Invite other users to my match</a:t>
+            </a:r>
+          </a:p>
+          <a:p>
+            <a:pPr lvl="2"/>
+            <a:r>
+              <a:rPr lang="en-US" dirty="0"/>
+              <a:t>View my ongoing matches</a:t>
+            </a:r>
+          </a:p>
+          <a:p>
+            <a:pPr lvl="2"/>
+            <a:r>
+              <a:rPr lang="en-US" dirty="0"/>
+              <a:t>See the board of one of my matches</a:t>
+            </a:r>
+          </a:p>
+          <a:p>
+            <a:pPr lvl="2"/>
+            <a:endParaRPr lang="en-US" dirty="0"/>
+          </a:p>
+          <a:p>
+            <a:pPr lvl="2"/>
+            <a:endParaRPr lang="en-US" dirty="0"/>
+          </a:p>
+        </p:txBody>
+      </p:sp>
+      <p:sp>
+        <p:nvSpPr>
+          <p:cNvPr id="4" name="TextBox 3">
+            <a:extLst>
+              <a:ext uri="{FF2B5EF4-FFF2-40B4-BE49-F238E27FC236}">
+                <a16:creationId xmlns:a16="http://schemas.microsoft.com/office/drawing/2014/main" id="{9C880122-E223-D14D-841F-898F49370CEB}"/>
+              </a:ext>
+            </a:extLst>
+          </p:cNvPr>
+          <p:cNvSpPr txBox="1"/>
+          <p:nvPr/>
+        </p:nvSpPr>
+        <p:spPr>
+          <a:xfrm>
+            <a:off x="4663440" y="3191256"/>
+            <a:ext cx="3170996" cy="2303195"/>
+          </a:xfrm>
+          <a:prstGeom prst="rect">
+            <a:avLst/>
+          </a:prstGeom>
+          <a:noFill/>
+        </p:spPr>
+        <p:txBody>
+          <a:bodyPr wrap="none" rtlCol="0">
+            <a:spAutoFit/>
+          </a:bodyPr>
+          <a:lstStyle/>
+          <a:p>
+            <a:pPr marL="1143000" lvl="2" indent="-228600">
+              <a:spcBef>
+                <a:spcPts val="1000"/>
+              </a:spcBef>
+              <a:buClr>
+                <a:srgbClr val="90C226"/>
+              </a:buClr>
+              <a:buSzPct val="80000"/>
+              <a:buFont typeface="Wingdings 3" charset="2"/>
+              <a:buChar char=""/>
+            </a:pPr>
+            <a:r>
+              <a:rPr lang="en-US" sz="1400" dirty="0">
+                <a:solidFill>
+                  <a:prstClr val="white">
+                    <a:lumMod val="75000"/>
+                    <a:lumOff val="25000"/>
+                  </a:prstClr>
+                </a:solidFill>
+              </a:rPr>
+              <a:t>Make a move</a:t>
+            </a:r>
+          </a:p>
+          <a:p>
+            <a:pPr marL="1143000" lvl="2" indent="-228600">
+              <a:spcBef>
+                <a:spcPts val="1000"/>
+              </a:spcBef>
+              <a:buClr>
+                <a:srgbClr val="90C226"/>
+              </a:buClr>
+              <a:buSzPct val="80000"/>
+              <a:buFont typeface="Wingdings 3" charset="2"/>
+              <a:buChar char=""/>
+            </a:pPr>
+            <a:r>
+              <a:rPr lang="en-US" sz="1400" dirty="0">
+                <a:solidFill>
+                  <a:prstClr val="white">
+                    <a:lumMod val="75000"/>
+                    <a:lumOff val="25000"/>
+                  </a:prstClr>
+                </a:solidFill>
+              </a:rPr>
+              <a:t>Quit an ongoing match</a:t>
+            </a:r>
+          </a:p>
+          <a:p>
+            <a:pPr marL="1143000" lvl="2" indent="-228600">
+              <a:spcBef>
+                <a:spcPts val="1000"/>
+              </a:spcBef>
+              <a:buClr>
+                <a:srgbClr val="90C226"/>
+              </a:buClr>
+              <a:buSzPct val="80000"/>
+              <a:buFont typeface="Wingdings 3" charset="2"/>
+              <a:buChar char=""/>
+            </a:pPr>
+            <a:r>
+              <a:rPr lang="en-US" sz="1400" dirty="0">
+                <a:solidFill>
+                  <a:prstClr val="white">
+                    <a:lumMod val="75000"/>
+                    <a:lumOff val="25000"/>
+                  </a:prstClr>
+                </a:solidFill>
+              </a:rPr>
+              <a:t>View my user profile</a:t>
+            </a:r>
+          </a:p>
+          <a:p>
+            <a:pPr marL="1143000" lvl="2" indent="-228600">
+              <a:spcBef>
+                <a:spcPts val="1000"/>
+              </a:spcBef>
+              <a:buClr>
+                <a:srgbClr val="90C226"/>
+              </a:buClr>
+              <a:buSzPct val="80000"/>
+              <a:buFont typeface="Wingdings 3" charset="2"/>
+              <a:buChar char=""/>
+            </a:pPr>
+            <a:r>
+              <a:rPr lang="en-US" sz="1400" dirty="0">
+                <a:solidFill>
+                  <a:prstClr val="white">
+                    <a:lumMod val="75000"/>
+                    <a:lumOff val="25000"/>
+                  </a:prstClr>
+                </a:solidFill>
+              </a:rPr>
+              <a:t>View my match history</a:t>
+            </a:r>
+          </a:p>
+          <a:p>
+            <a:pPr marL="1143000" lvl="2" indent="-228600">
+              <a:spcBef>
+                <a:spcPts val="1000"/>
+              </a:spcBef>
+              <a:buClr>
+                <a:srgbClr val="90C226"/>
+              </a:buClr>
+              <a:buSzPct val="80000"/>
+              <a:buFont typeface="Wingdings 3" charset="2"/>
+              <a:buChar char=""/>
+            </a:pPr>
+            <a:r>
+              <a:rPr lang="en-US" sz="1400" dirty="0">
+                <a:solidFill>
+                  <a:prstClr val="white">
+                    <a:lumMod val="75000"/>
+                    <a:lumOff val="25000"/>
+                  </a:prstClr>
+                </a:solidFill>
+              </a:rPr>
+              <a:t>Logout of my account</a:t>
+            </a:r>
+          </a:p>
+          <a:p>
+            <a:pPr marL="1143000" lvl="2" indent="-228600">
+              <a:spcBef>
+                <a:spcPts val="1000"/>
+              </a:spcBef>
+              <a:buClr>
+                <a:srgbClr val="90C226"/>
+              </a:buClr>
+              <a:buSzPct val="80000"/>
+              <a:buFont typeface="Wingdings 3" charset="2"/>
+              <a:buChar char=""/>
+            </a:pPr>
+            <a:r>
+              <a:rPr lang="en-US" sz="1400" dirty="0">
+                <a:solidFill>
+                  <a:prstClr val="white">
+                    <a:lumMod val="75000"/>
+                    <a:lumOff val="25000"/>
+                  </a:prstClr>
+                </a:solidFill>
+              </a:rPr>
+              <a:t>Delete my account</a:t>
+            </a:r>
+          </a:p>
+          <a:p>
+            <a:endParaRPr lang="en-US" dirty="0"/>
           </a:p>
         </p:txBody>
       </p:sp>
       <p:pic>
         <p:nvPicPr>
-          <p:cNvPr id="5" name="Content Placeholder 4" descr="Graphical user interface, application&#10;&#10;Description automatically generated">
+          <p:cNvPr id="5" name="Audio 4">
+            <a:hlinkClick r:id="" action="ppaction://media"/>
             <a:extLst>
               <a:ext uri="{FF2B5EF4-FFF2-40B4-BE49-F238E27FC236}">
-                <a16:creationId xmlns:a16="http://schemas.microsoft.com/office/drawing/2014/main" id="{2ABBBF90-D3CD-4564-B376-7E63AAC56993}"/>
+                <a16:creationId xmlns:a16="http://schemas.microsoft.com/office/drawing/2014/main" id="{BA3E607D-D1EE-E04E-AF81-6DAC52AF6611}"/>
               </a:ext>
             </a:extLst>
           </p:cNvPr>
           <p:cNvPicPr>
-            <a:picLocks noGrp="1" noChangeAspect="1"/>
+            <a:picLocks noChangeAspect="1"/>
           </p:cNvPicPr>
           <p:nvPr>
-            <p:ph idx="1"/>
+            <a:audioFile r:link="rId2"/>
+            <p:extLst>
+              <p:ext uri="{DAA4B4D4-6D71-4841-9C94-3DE7FCFB9230}">
+                <p14:media xmlns:p14="http://schemas.microsoft.com/office/powerpoint/2010/main" r:embed="rId1"/>
+              </p:ext>
+            </p:extLst>
           </p:nvPr>
         </p:nvPicPr>
         <p:blipFill>
-          <a:blip r:embed="rId2">
-            <a:extLst>
-              <a:ext uri="{28A0092B-C50C-407E-A947-70E740481C1C}">
-                <a14:useLocalDpi xmlns:a14="http://schemas.microsoft.com/office/drawing/2010/main" val="0"/>
-              </a:ext>
-            </a:extLst>
-          </a:blip>
+          <a:blip r:embed="rId4"/>
           <a:stretch>
             <a:fillRect/>
           </a:stretch>
         </p:blipFill>
         <p:spPr>
           <a:xfrm>
-            <a:off x="6604986" y="418725"/>
-            <a:ext cx="5587014" cy="6020550"/>
+            <a:off x="11226800" y="5892800"/>
+            <a:ext cx="812800" cy="812800"/>
           </a:xfrm>
+          <a:prstGeom prst="rect">
+            <a:avLst/>
+          </a:prstGeom>
         </p:spPr>
       </p:pic>
     </p:spTree>
     <p:extLst>
       <p:ext uri="{BB962C8B-B14F-4D97-AF65-F5344CB8AC3E}">
-        <p14:creationId xmlns:p14="http://schemas.microsoft.com/office/powerpoint/2010/main" val="3973891964"/>
+        <p14:creationId xmlns:p14="http://schemas.microsoft.com/office/powerpoint/2010/main" val="1783871704"/>
       </p:ext>
     </p:extLst>
   </p:cSld>
   <p:clrMapOvr>
     <a:masterClrMapping/>
   </p:clrMapOvr>
+  <mc:AlternateContent xmlns:mc="http://schemas.openxmlformats.org/markup-compatibility/2006">
+    <mc:Choice xmlns:p14="http://schemas.microsoft.com/office/powerpoint/2010/main" Requires="p14">
+      <p:transition spd="slow" p14:dur="2000" advTm="34473"/>
+    </mc:Choice>
+    <mc:Fallback>
+      <p:transition spd="slow" advTm="34473"/>
+    </mc:Fallback>
+  </mc:AlternateContent>
+  <p:timing>
+    <p:tnLst>
+      <p:par>
+        <p:cTn id="1" dur="indefinite" restart="never" nodeType="tmRoot">
+          <p:childTnLst>
+            <p:seq concurrent="1" nextAc="seek">
+              <p:cTn id="2" dur="indefinite" nodeType="mainSeq">
+                <p:childTnLst>
+                  <p:par>
+                    <p:cTn id="3" fill="hold">
+                      <p:stCondLst>
+                        <p:cond delay="indefinite"/>
+                        <p:cond evt="onBegin" delay="0">
+                          <p:tn val="2"/>
+                        </p:cond>
+                      </p:stCondLst>
+                      <p:childTnLst>
+                        <p:par>
+                          <p:cTn id="4" fill="hold">
+                            <p:stCondLst>
+                              <p:cond delay="0"/>
+                            </p:stCondLst>
+                            <p:childTnLst>
+                              <p:par>
+                                <p:cTn id="5" presetID="1" presetClass="mediacall" presetSubtype="0" fill="hold" nodeType="afterEffect">
+                                  <p:stCondLst>
+                                    <p:cond delay="0"/>
+                                  </p:stCondLst>
+                                  <p:childTnLst>
+                                    <p:cmd type="call" cmd="playFrom(0.0)">
+                                      <p:cBhvr>
+                                        <p:cTn id="6" dur="1" fill="hold"/>
+                                        <p:tgtEl>
+                                          <p:spTgt spid="5"/>
+                                        </p:tgtEl>
+                                      </p:cBhvr>
+                                    </p:cmd>
+                                  </p:childTnLst>
+                                </p:cTn>
+                              </p:par>
+                            </p:childTnLst>
+                          </p:cTn>
+                        </p:par>
+                      </p:childTnLst>
+                    </p:cTn>
+                  </p:par>
+                </p:childTnLst>
+              </p:cTn>
+              <p:prevCondLst>
+                <p:cond evt="onPrev" delay="0">
+                  <p:tgtEl>
+                    <p:sldTgt/>
+                  </p:tgtEl>
+                </p:cond>
+              </p:prevCondLst>
+              <p:nextCondLst>
+                <p:cond evt="onNext" delay="0">
+                  <p:tgtEl>
+                    <p:sldTgt/>
+                  </p:tgtEl>
+                </p:cond>
+              </p:nextCondLst>
+            </p:seq>
+            <p:audio isNarration="1">
+              <p:cMediaNode vol="80000" showWhenStopped="0">
+                <p:cTn id="7" fill="hold" display="0">
+                  <p:stCondLst>
+                    <p:cond delay="indefinite"/>
+                  </p:stCondLst>
+                  <p:endCondLst>
+                    <p:cond evt="onStopAudio" delay="0">
+                      <p:tgtEl>
+                        <p:sldTgt/>
+                      </p:tgtEl>
+                    </p:cond>
+                  </p:endCondLst>
+                </p:cTn>
+                <p:tgtEl>
+                  <p:spTgt spid="5"/>
+                </p:tgtEl>
+              </p:cMediaNode>
+            </p:audio>
+          </p:childTnLst>
+        </p:cTn>
+      </p:par>
+    </p:tnLst>
+  </p:timing>
 </p:sld>
 </file>
 
@@ -6492,6 +8573,666 @@
           <p:cNvPr id="2" name="Title 1">
             <a:extLst>
               <a:ext uri="{FF2B5EF4-FFF2-40B4-BE49-F238E27FC236}">
+                <a16:creationId xmlns:a16="http://schemas.microsoft.com/office/drawing/2014/main" id="{FAC95A89-10CD-4AF6-8A54-291FEB82B515}"/>
+              </a:ext>
+            </a:extLst>
+          </p:cNvPr>
+          <p:cNvSpPr>
+            <a:spLocks noGrp="1"/>
+          </p:cNvSpPr>
+          <p:nvPr>
+            <p:ph type="title"/>
+          </p:nvPr>
+        </p:nvSpPr>
+        <p:spPr/>
+        <p:txBody>
+          <a:bodyPr/>
+          <a:lstStyle/>
+          <a:p>
+            <a:r>
+              <a:rPr lang="en-US" dirty="0"/>
+              <a:t>Class Diagram</a:t>
+            </a:r>
+            <a:br>
+              <a:rPr lang="en-US" dirty="0"/>
+            </a:br>
+            <a:endParaRPr lang="en-US" dirty="0"/>
+          </a:p>
+        </p:txBody>
+      </p:sp>
+      <p:sp>
+        <p:nvSpPr>
+          <p:cNvPr id="3" name="TextBox 2">
+            <a:extLst>
+              <a:ext uri="{FF2B5EF4-FFF2-40B4-BE49-F238E27FC236}">
+                <a16:creationId xmlns:a16="http://schemas.microsoft.com/office/drawing/2014/main" id="{BE974A8E-E556-4F46-BF2D-2D93C02F87D5}"/>
+              </a:ext>
+            </a:extLst>
+          </p:cNvPr>
+          <p:cNvSpPr txBox="1"/>
+          <p:nvPr/>
+        </p:nvSpPr>
+        <p:spPr>
+          <a:xfrm>
+            <a:off x="677334" y="1607234"/>
+            <a:ext cx="4927938" cy="1328569"/>
+          </a:xfrm>
+          <a:prstGeom prst="rect">
+            <a:avLst/>
+          </a:prstGeom>
+          <a:noFill/>
+        </p:spPr>
+        <p:txBody>
+          <a:bodyPr wrap="square" rtlCol="0">
+            <a:spAutoFit/>
+          </a:bodyPr>
+          <a:lstStyle/>
+          <a:p>
+            <a:pPr marL="342900" lvl="0" indent="-342900">
+              <a:spcBef>
+                <a:spcPts val="1000"/>
+              </a:spcBef>
+              <a:buClr>
+                <a:srgbClr val="90C226"/>
+              </a:buClr>
+              <a:buSzPct val="80000"/>
+              <a:buFont typeface="Wingdings 3" charset="2"/>
+              <a:buChar char=""/>
+            </a:pPr>
+            <a:r>
+              <a:rPr lang="en-US" dirty="0">
+                <a:solidFill>
+                  <a:prstClr val="white">
+                    <a:lumMod val="75000"/>
+                    <a:lumOff val="25000"/>
+                  </a:prstClr>
+                </a:solidFill>
+              </a:rPr>
+              <a:t>Visual depiction of class interactions</a:t>
+            </a:r>
+          </a:p>
+          <a:p>
+            <a:pPr marL="342900" lvl="0" indent="-342900">
+              <a:spcBef>
+                <a:spcPts val="1000"/>
+              </a:spcBef>
+              <a:buClr>
+                <a:srgbClr val="90C226"/>
+              </a:buClr>
+              <a:buSzPct val="80000"/>
+              <a:buFont typeface="Wingdings 3" charset="2"/>
+              <a:buChar char=""/>
+            </a:pPr>
+            <a:r>
+              <a:rPr lang="en-US" dirty="0">
+                <a:solidFill>
+                  <a:prstClr val="white">
+                    <a:lumMod val="75000"/>
+                    <a:lumOff val="25000"/>
+                  </a:prstClr>
+                </a:solidFill>
+              </a:rPr>
+              <a:t>Describes the functions of the system and its components</a:t>
+            </a:r>
+          </a:p>
+          <a:p>
+            <a:endParaRPr lang="en-US" dirty="0"/>
+          </a:p>
+        </p:txBody>
+      </p:sp>
+      <p:pic>
+        <p:nvPicPr>
+          <p:cNvPr id="7" name="Picture 6" descr="Diagram, schematic&#10;&#10;Description automatically generated">
+            <a:extLst>
+              <a:ext uri="{FF2B5EF4-FFF2-40B4-BE49-F238E27FC236}">
+                <a16:creationId xmlns:a16="http://schemas.microsoft.com/office/drawing/2014/main" id="{503572DA-7052-724F-9394-BA8655126FED}"/>
+              </a:ext>
+            </a:extLst>
+          </p:cNvPr>
+          <p:cNvPicPr>
+            <a:picLocks noChangeAspect="1"/>
+          </p:cNvPicPr>
+          <p:nvPr/>
+        </p:nvPicPr>
+        <p:blipFill>
+          <a:blip r:embed="rId4">
+            <a:extLst>
+              <a:ext uri="{28A0092B-C50C-407E-A947-70E740481C1C}">
+                <a14:useLocalDpi xmlns:a14="http://schemas.microsoft.com/office/drawing/2010/main" val="0"/>
+              </a:ext>
+            </a:extLst>
+          </a:blip>
+          <a:stretch>
+            <a:fillRect/>
+          </a:stretch>
+        </p:blipFill>
+        <p:spPr>
+          <a:xfrm>
+            <a:off x="5798234" y="0"/>
+            <a:ext cx="6393766" cy="6858000"/>
+          </a:xfrm>
+          <a:prstGeom prst="rect">
+            <a:avLst/>
+          </a:prstGeom>
+        </p:spPr>
+      </p:pic>
+      <p:pic>
+        <p:nvPicPr>
+          <p:cNvPr id="8" name="Audio 7">
+            <a:hlinkClick r:id="" action="ppaction://media"/>
+            <a:extLst>
+              <a:ext uri="{FF2B5EF4-FFF2-40B4-BE49-F238E27FC236}">
+                <a16:creationId xmlns:a16="http://schemas.microsoft.com/office/drawing/2014/main" id="{8A1BA859-6B0F-8841-977E-17F6F0F45876}"/>
+              </a:ext>
+            </a:extLst>
+          </p:cNvPr>
+          <p:cNvPicPr>
+            <a:picLocks noChangeAspect="1"/>
+          </p:cNvPicPr>
+          <p:nvPr>
+            <a:audioFile r:link="rId2"/>
+            <p:extLst>
+              <p:ext uri="{DAA4B4D4-6D71-4841-9C94-3DE7FCFB9230}">
+                <p14:media xmlns:p14="http://schemas.microsoft.com/office/powerpoint/2010/main" r:embed="rId1"/>
+              </p:ext>
+            </p:extLst>
+          </p:nvPr>
+        </p:nvPicPr>
+        <p:blipFill>
+          <a:blip r:embed="rId5"/>
+          <a:stretch>
+            <a:fillRect/>
+          </a:stretch>
+        </p:blipFill>
+        <p:spPr>
+          <a:xfrm>
+            <a:off x="11226800" y="5892800"/>
+            <a:ext cx="812800" cy="812800"/>
+          </a:xfrm>
+          <a:prstGeom prst="rect">
+            <a:avLst/>
+          </a:prstGeom>
+        </p:spPr>
+      </p:pic>
+    </p:spTree>
+    <p:extLst>
+      <p:ext uri="{BB962C8B-B14F-4D97-AF65-F5344CB8AC3E}">
+        <p14:creationId xmlns:p14="http://schemas.microsoft.com/office/powerpoint/2010/main" val="2177716728"/>
+      </p:ext>
+    </p:extLst>
+  </p:cSld>
+  <p:clrMapOvr>
+    <a:masterClrMapping/>
+  </p:clrMapOvr>
+  <mc:AlternateContent xmlns:mc="http://schemas.openxmlformats.org/markup-compatibility/2006">
+    <mc:Choice xmlns:p14="http://schemas.microsoft.com/office/powerpoint/2010/main" Requires="p14">
+      <p:transition spd="slow" p14:dur="2000" advTm="52920"/>
+    </mc:Choice>
+    <mc:Fallback>
+      <p:transition spd="slow" advTm="52920"/>
+    </mc:Fallback>
+  </mc:AlternateContent>
+  <p:timing>
+    <p:tnLst>
+      <p:par>
+        <p:cTn id="1" dur="indefinite" restart="never" nodeType="tmRoot">
+          <p:childTnLst>
+            <p:seq concurrent="1" nextAc="seek">
+              <p:cTn id="2" dur="indefinite" nodeType="mainSeq">
+                <p:childTnLst>
+                  <p:par>
+                    <p:cTn id="3" fill="hold">
+                      <p:stCondLst>
+                        <p:cond delay="indefinite"/>
+                        <p:cond evt="onBegin" delay="0">
+                          <p:tn val="2"/>
+                        </p:cond>
+                      </p:stCondLst>
+                      <p:childTnLst>
+                        <p:par>
+                          <p:cTn id="4" fill="hold">
+                            <p:stCondLst>
+                              <p:cond delay="0"/>
+                            </p:stCondLst>
+                            <p:childTnLst>
+                              <p:par>
+                                <p:cTn id="5" presetID="1" presetClass="mediacall" presetSubtype="0" fill="hold" nodeType="afterEffect">
+                                  <p:stCondLst>
+                                    <p:cond delay="0"/>
+                                  </p:stCondLst>
+                                  <p:childTnLst>
+                                    <p:cmd type="call" cmd="playFrom(0.0)">
+                                      <p:cBhvr>
+                                        <p:cTn id="6" dur="1" fill="hold"/>
+                                        <p:tgtEl>
+                                          <p:spTgt spid="8"/>
+                                        </p:tgtEl>
+                                      </p:cBhvr>
+                                    </p:cmd>
+                                  </p:childTnLst>
+                                </p:cTn>
+                              </p:par>
+                            </p:childTnLst>
+                          </p:cTn>
+                        </p:par>
+                      </p:childTnLst>
+                    </p:cTn>
+                  </p:par>
+                </p:childTnLst>
+              </p:cTn>
+              <p:prevCondLst>
+                <p:cond evt="onPrev" delay="0">
+                  <p:tgtEl>
+                    <p:sldTgt/>
+                  </p:tgtEl>
+                </p:cond>
+              </p:prevCondLst>
+              <p:nextCondLst>
+                <p:cond evt="onNext" delay="0">
+                  <p:tgtEl>
+                    <p:sldTgt/>
+                  </p:tgtEl>
+                </p:cond>
+              </p:nextCondLst>
+            </p:seq>
+            <p:audio isNarration="1">
+              <p:cMediaNode vol="80000" showWhenStopped="0">
+                <p:cTn id="7" fill="hold" display="0">
+                  <p:stCondLst>
+                    <p:cond delay="indefinite"/>
+                  </p:stCondLst>
+                  <p:endCondLst>
+                    <p:cond evt="onStopAudio" delay="0">
+                      <p:tgtEl>
+                        <p:sldTgt/>
+                      </p:tgtEl>
+                    </p:cond>
+                  </p:endCondLst>
+                </p:cTn>
+                <p:tgtEl>
+                  <p:spTgt spid="8"/>
+                </p:tgtEl>
+              </p:cMediaNode>
+            </p:audio>
+          </p:childTnLst>
+        </p:cTn>
+      </p:par>
+    </p:tnLst>
+  </p:timing>
+</p:sld>
+</file>
+
+<file path=ppt/slides/slide8.xml><?xml version="1.0" encoding="utf-8"?>
+<p:sld xmlns:a="http://schemas.openxmlformats.org/drawingml/2006/main" xmlns:r="http://schemas.openxmlformats.org/officeDocument/2006/relationships" xmlns:p="http://schemas.openxmlformats.org/presentationml/2006/main">
+  <p:cSld>
+    <p:spTree>
+      <p:nvGrpSpPr>
+        <p:cNvPr id="1" name=""/>
+        <p:cNvGrpSpPr/>
+        <p:nvPr/>
+      </p:nvGrpSpPr>
+      <p:grpSpPr>
+        <a:xfrm>
+          <a:off x="0" y="0"/>
+          <a:ext cx="0" cy="0"/>
+          <a:chOff x="0" y="0"/>
+          <a:chExt cx="0" cy="0"/>
+        </a:xfrm>
+      </p:grpSpPr>
+      <p:sp>
+        <p:nvSpPr>
+          <p:cNvPr id="2" name="Title 1">
+            <a:extLst>
+              <a:ext uri="{FF2B5EF4-FFF2-40B4-BE49-F238E27FC236}">
+                <a16:creationId xmlns:a16="http://schemas.microsoft.com/office/drawing/2014/main" id="{CA27DF44-574C-4B20-ADD7-9BFC782C7CE9}"/>
+              </a:ext>
+            </a:extLst>
+          </p:cNvPr>
+          <p:cNvSpPr>
+            <a:spLocks noGrp="1"/>
+          </p:cNvSpPr>
+          <p:nvPr>
+            <p:ph type="title"/>
+          </p:nvPr>
+        </p:nvSpPr>
+        <p:spPr/>
+        <p:txBody>
+          <a:bodyPr/>
+          <a:lstStyle/>
+          <a:p>
+            <a:r>
+              <a:rPr lang="en-US" dirty="0"/>
+              <a:t>Kanban board</a:t>
+            </a:r>
+          </a:p>
+        </p:txBody>
+      </p:sp>
+      <p:pic>
+        <p:nvPicPr>
+          <p:cNvPr id="5" name="Content Placeholder 4" descr="Graphical user interface, application&#10;&#10;Description automatically generated">
+            <a:extLst>
+              <a:ext uri="{FF2B5EF4-FFF2-40B4-BE49-F238E27FC236}">
+                <a16:creationId xmlns:a16="http://schemas.microsoft.com/office/drawing/2014/main" id="{2ABBBF90-D3CD-4564-B376-7E63AAC56993}"/>
+              </a:ext>
+            </a:extLst>
+          </p:cNvPr>
+          <p:cNvPicPr>
+            <a:picLocks noGrp="1" noChangeAspect="1"/>
+          </p:cNvPicPr>
+          <p:nvPr>
+            <p:ph idx="1"/>
+          </p:nvPr>
+        </p:nvPicPr>
+        <p:blipFill>
+          <a:blip r:embed="rId4">
+            <a:extLst>
+              <a:ext uri="{28A0092B-C50C-407E-A947-70E740481C1C}">
+                <a14:useLocalDpi xmlns:a14="http://schemas.microsoft.com/office/drawing/2010/main" val="0"/>
+              </a:ext>
+            </a:extLst>
+          </a:blip>
+          <a:stretch>
+            <a:fillRect/>
+          </a:stretch>
+        </p:blipFill>
+        <p:spPr>
+          <a:xfrm>
+            <a:off x="6264349" y="418725"/>
+            <a:ext cx="5587014" cy="6020550"/>
+          </a:xfrm>
+        </p:spPr>
+      </p:pic>
+      <p:sp>
+        <p:nvSpPr>
+          <p:cNvPr id="3" name="TextBox 2">
+            <a:extLst>
+              <a:ext uri="{FF2B5EF4-FFF2-40B4-BE49-F238E27FC236}">
+                <a16:creationId xmlns:a16="http://schemas.microsoft.com/office/drawing/2014/main" id="{8DF80023-141C-B24F-A628-A118E5C6B2ED}"/>
+              </a:ext>
+            </a:extLst>
+          </p:cNvPr>
+          <p:cNvSpPr txBox="1"/>
+          <p:nvPr/>
+        </p:nvSpPr>
+        <p:spPr>
+          <a:xfrm>
+            <a:off x="677334" y="1600200"/>
+            <a:ext cx="5587015" cy="1456809"/>
+          </a:xfrm>
+          <a:prstGeom prst="rect">
+            <a:avLst/>
+          </a:prstGeom>
+          <a:noFill/>
+        </p:spPr>
+        <p:txBody>
+          <a:bodyPr wrap="square" rtlCol="0">
+            <a:spAutoFit/>
+          </a:bodyPr>
+          <a:lstStyle/>
+          <a:p>
+            <a:pPr marL="342900" lvl="0" indent="-342900">
+              <a:spcBef>
+                <a:spcPts val="1000"/>
+              </a:spcBef>
+              <a:buClr>
+                <a:srgbClr val="90C226"/>
+              </a:buClr>
+              <a:buSzPct val="80000"/>
+              <a:buFont typeface="Wingdings 3" charset="2"/>
+              <a:buChar char=""/>
+            </a:pPr>
+            <a:r>
+              <a:rPr lang="en-US" dirty="0">
+                <a:solidFill>
+                  <a:prstClr val="white">
+                    <a:lumMod val="75000"/>
+                    <a:lumOff val="25000"/>
+                  </a:prstClr>
+                </a:solidFill>
+              </a:rPr>
+              <a:t>Used to track task status</a:t>
+            </a:r>
+          </a:p>
+          <a:p>
+            <a:pPr marL="342900" lvl="0" indent="-342900">
+              <a:spcBef>
+                <a:spcPts val="1000"/>
+              </a:spcBef>
+              <a:buClr>
+                <a:srgbClr val="90C226"/>
+              </a:buClr>
+              <a:buSzPct val="80000"/>
+              <a:buFont typeface="Wingdings 3" charset="2"/>
+              <a:buChar char=""/>
+            </a:pPr>
+            <a:r>
+              <a:rPr lang="en-US" dirty="0">
+                <a:solidFill>
+                  <a:prstClr val="white">
+                    <a:lumMod val="75000"/>
+                    <a:lumOff val="25000"/>
+                  </a:prstClr>
+                </a:solidFill>
+              </a:rPr>
+              <a:t>Includes all epics chose for current sprint</a:t>
+            </a:r>
+          </a:p>
+          <a:p>
+            <a:pPr marL="342900" lvl="0" indent="-342900">
+              <a:spcBef>
+                <a:spcPts val="1000"/>
+              </a:spcBef>
+              <a:buClr>
+                <a:srgbClr val="90C226"/>
+              </a:buClr>
+              <a:buSzPct val="80000"/>
+              <a:buFont typeface="Wingdings 3" charset="2"/>
+              <a:buChar char=""/>
+            </a:pPr>
+            <a:r>
+              <a:rPr lang="en-US" dirty="0">
+                <a:solidFill>
+                  <a:prstClr val="white">
+                    <a:lumMod val="75000"/>
+                    <a:lumOff val="25000"/>
+                  </a:prstClr>
+                </a:solidFill>
+              </a:rPr>
+              <a:t>Implemented using </a:t>
+            </a:r>
+            <a:r>
+              <a:rPr lang="en-US" dirty="0" err="1">
+                <a:solidFill>
+                  <a:prstClr val="white">
+                    <a:lumMod val="75000"/>
+                    <a:lumOff val="25000"/>
+                  </a:prstClr>
+                </a:solidFill>
+              </a:rPr>
+              <a:t>ZenHub</a:t>
+            </a:r>
+            <a:endParaRPr lang="en-US" dirty="0">
+              <a:solidFill>
+                <a:prstClr val="white">
+                  <a:lumMod val="75000"/>
+                  <a:lumOff val="25000"/>
+                </a:prstClr>
+              </a:solidFill>
+            </a:endParaRPr>
+          </a:p>
+          <a:p>
+            <a:endParaRPr lang="en-US" dirty="0"/>
+          </a:p>
+        </p:txBody>
+      </p:sp>
+      <p:pic>
+        <p:nvPicPr>
+          <p:cNvPr id="4" name="Audio 3">
+            <a:hlinkClick r:id="" action="ppaction://media"/>
+            <a:extLst>
+              <a:ext uri="{FF2B5EF4-FFF2-40B4-BE49-F238E27FC236}">
+                <a16:creationId xmlns:a16="http://schemas.microsoft.com/office/drawing/2014/main" id="{3D66B46B-F04D-C24C-B2F5-0B6E3B2DEE9A}"/>
+              </a:ext>
+            </a:extLst>
+          </p:cNvPr>
+          <p:cNvPicPr>
+            <a:picLocks noChangeAspect="1"/>
+          </p:cNvPicPr>
+          <p:nvPr>
+            <a:audioFile r:link="rId2"/>
+            <p:extLst>
+              <p:ext uri="{DAA4B4D4-6D71-4841-9C94-3DE7FCFB9230}">
+                <p14:media xmlns:p14="http://schemas.microsoft.com/office/powerpoint/2010/main" r:embed="rId1"/>
+              </p:ext>
+            </p:extLst>
+          </p:nvPr>
+        </p:nvPicPr>
+        <p:blipFill>
+          <a:blip r:embed="rId5"/>
+          <a:stretch>
+            <a:fillRect/>
+          </a:stretch>
+        </p:blipFill>
+        <p:spPr>
+          <a:xfrm>
+            <a:off x="11226800" y="5892800"/>
+            <a:ext cx="812800" cy="812800"/>
+          </a:xfrm>
+          <a:prstGeom prst="rect">
+            <a:avLst/>
+          </a:prstGeom>
+        </p:spPr>
+      </p:pic>
+    </p:spTree>
+    <p:extLst>
+      <p:ext uri="{BB962C8B-B14F-4D97-AF65-F5344CB8AC3E}">
+        <p14:creationId xmlns:p14="http://schemas.microsoft.com/office/powerpoint/2010/main" val="3973891964"/>
+      </p:ext>
+    </p:extLst>
+  </p:cSld>
+  <p:clrMapOvr>
+    <a:masterClrMapping/>
+  </p:clrMapOvr>
+  <mc:AlternateContent xmlns:mc="http://schemas.openxmlformats.org/markup-compatibility/2006">
+    <mc:Choice xmlns:p14="http://schemas.microsoft.com/office/powerpoint/2010/main" Requires="p14">
+      <p:transition spd="slow" p14:dur="2000" advTm="48915"/>
+    </mc:Choice>
+    <mc:Fallback>
+      <p:transition spd="slow" advTm="48915"/>
+    </mc:Fallback>
+  </mc:AlternateContent>
+  <p:timing>
+    <p:tnLst>
+      <p:par>
+        <p:cTn id="1" dur="indefinite" restart="never" nodeType="tmRoot">
+          <p:childTnLst>
+            <p:seq concurrent="1" nextAc="seek">
+              <p:cTn id="2" dur="indefinite" nodeType="mainSeq">
+                <p:childTnLst>
+                  <p:par>
+                    <p:cTn id="3" fill="hold">
+                      <p:stCondLst>
+                        <p:cond delay="indefinite"/>
+                        <p:cond evt="onBegin" delay="0">
+                          <p:tn val="2"/>
+                        </p:cond>
+                      </p:stCondLst>
+                      <p:childTnLst>
+                        <p:par>
+                          <p:cTn id="4" fill="hold">
+                            <p:stCondLst>
+                              <p:cond delay="0"/>
+                            </p:stCondLst>
+                            <p:childTnLst>
+                              <p:par>
+                                <p:cTn id="5" presetID="1" presetClass="mediacall" presetSubtype="0" fill="hold" nodeType="afterEffect">
+                                  <p:stCondLst>
+                                    <p:cond delay="0"/>
+                                  </p:stCondLst>
+                                  <p:childTnLst>
+                                    <p:cmd type="call" cmd="playFrom(0.0)">
+                                      <p:cBhvr>
+                                        <p:cTn id="6" dur="1" fill="hold"/>
+                                        <p:tgtEl>
+                                          <p:spTgt spid="4"/>
+                                        </p:tgtEl>
+                                      </p:cBhvr>
+                                    </p:cmd>
+                                  </p:childTnLst>
+                                </p:cTn>
+                              </p:par>
+                            </p:childTnLst>
+                          </p:cTn>
+                        </p:par>
+                      </p:childTnLst>
+                    </p:cTn>
+                  </p:par>
+                </p:childTnLst>
+              </p:cTn>
+              <p:prevCondLst>
+                <p:cond evt="onPrev" delay="0">
+                  <p:tgtEl>
+                    <p:sldTgt/>
+                  </p:tgtEl>
+                </p:cond>
+              </p:prevCondLst>
+              <p:nextCondLst>
+                <p:cond evt="onNext" delay="0">
+                  <p:tgtEl>
+                    <p:sldTgt/>
+                  </p:tgtEl>
+                </p:cond>
+              </p:nextCondLst>
+            </p:seq>
+            <p:audio isNarration="1">
+              <p:cMediaNode vol="80000" showWhenStopped="0">
+                <p:cTn id="7" fill="hold" display="0">
+                  <p:stCondLst>
+                    <p:cond delay="indefinite"/>
+                  </p:stCondLst>
+                  <p:endCondLst>
+                    <p:cond evt="onStopAudio" delay="0">
+                      <p:tgtEl>
+                        <p:sldTgt/>
+                      </p:tgtEl>
+                    </p:cond>
+                  </p:endCondLst>
+                </p:cTn>
+                <p:tgtEl>
+                  <p:spTgt spid="4"/>
+                </p:tgtEl>
+              </p:cMediaNode>
+            </p:audio>
+          </p:childTnLst>
+        </p:cTn>
+      </p:par>
+    </p:tnLst>
+  </p:timing>
+</p:sld>
+</file>
+
+<file path=ppt/slides/slide9.xml><?xml version="1.0" encoding="utf-8"?>
+<p:sld xmlns:a="http://schemas.openxmlformats.org/drawingml/2006/main" xmlns:r="http://schemas.openxmlformats.org/officeDocument/2006/relationships" xmlns:p="http://schemas.openxmlformats.org/presentationml/2006/main">
+  <p:cSld>
+    <p:spTree>
+      <p:nvGrpSpPr>
+        <p:cNvPr id="1" name=""/>
+        <p:cNvGrpSpPr/>
+        <p:nvPr/>
+      </p:nvGrpSpPr>
+      <p:grpSpPr>
+        <a:xfrm>
+          <a:off x="0" y="0"/>
+          <a:ext cx="0" cy="0"/>
+          <a:chOff x="0" y="0"/>
+          <a:chExt cx="0" cy="0"/>
+        </a:xfrm>
+      </p:grpSpPr>
+      <p:sp>
+        <p:nvSpPr>
+          <p:cNvPr id="2" name="Title 1">
+            <a:extLst>
+              <a:ext uri="{FF2B5EF4-FFF2-40B4-BE49-F238E27FC236}">
                 <a16:creationId xmlns:a16="http://schemas.microsoft.com/office/drawing/2014/main" id="{AA256F39-4D68-49E9-B4CE-156B308762B1}"/>
               </a:ext>
             </a:extLst>
@@ -6531,46 +9272,124 @@
             <p:ph idx="1"/>
           </p:nvPr>
         </p:nvSpPr>
-        <p:spPr/>
+        <p:spPr>
+          <a:xfrm>
+            <a:off x="677334" y="2160589"/>
+            <a:ext cx="4731007" cy="3883595"/>
+          </a:xfrm>
+        </p:spPr>
         <p:txBody>
           <a:bodyPr/>
           <a:lstStyle/>
           <a:p>
             <a:r>
               <a:rPr lang="en-US" dirty="0"/>
-              <a:t>Scrum ceremonies let us coordinate between ourselves and where we needed to be in the project. Post-scrum time was a reliable time for us all to work and talk together at the same time, instead of asynchronously. </a:t>
+              <a:t>Tracked via sprint1.md document</a:t>
             </a:r>
           </a:p>
           <a:p>
             <a:r>
               <a:rPr lang="en-US" dirty="0"/>
-              <a:t>Material results included the Sprint documentation in Sprint1.md. </a:t>
+              <a:t>Include Scrum meetings 3x per week, Sprint planning, Sprint review, and Sprint retrospective</a:t>
             </a:r>
           </a:p>
           <a:p>
             <a:r>
               <a:rPr lang="en-US" dirty="0"/>
-              <a:t>The most valuable results were process results, which included concrete listing of tasks in </a:t>
-            </a:r>
-            <a:r>
-              <a:rPr lang="en-US" dirty="0" err="1"/>
-              <a:t>ZenHub</a:t>
-            </a:r>
+              <a:t>Retrospective Takeaways</a:t>
+            </a:r>
+          </a:p>
+          <a:p>
+            <a:pPr lvl="1"/>
             <a:r>
               <a:rPr lang="en-US" dirty="0"/>
-              <a:t> for us to complete and orientation</a:t>
-            </a:r>
-            <a:r>
-              <a:rPr lang="en-US"/>
-              <a:t>/planning </a:t>
-            </a:r>
+              <a:t>Schedule conflicts posed early issues but were resolved</a:t>
+            </a:r>
+          </a:p>
+          <a:p>
+            <a:pPr lvl="1"/>
             <a:r>
               <a:rPr lang="en-US" dirty="0"/>
-              <a:t>to complete those tasks. </a:t>
-            </a:r>
-          </a:p>
-        </p:txBody>
-      </p:sp>
+              <a:t>IDE-agnostic development environment</a:t>
+            </a:r>
+          </a:p>
+          <a:p>
+            <a:pPr lvl="1"/>
+            <a:r>
+              <a:rPr lang="en-US" dirty="0"/>
+              <a:t>Lots of learning around project setup</a:t>
+            </a:r>
+          </a:p>
+        </p:txBody>
+      </p:sp>
+      <p:pic>
+        <p:nvPicPr>
+          <p:cNvPr id="4" name="Picture 3">
+            <a:extLst>
+              <a:ext uri="{FF2B5EF4-FFF2-40B4-BE49-F238E27FC236}">
+                <a16:creationId xmlns:a16="http://schemas.microsoft.com/office/drawing/2014/main" id="{5C5C25C7-F6D0-AE49-8822-4A6A53DB08DC}"/>
+              </a:ext>
+            </a:extLst>
+          </p:cNvPr>
+          <p:cNvPicPr>
+            <a:picLocks noChangeAspect="1"/>
+          </p:cNvPicPr>
+          <p:nvPr/>
+        </p:nvPicPr>
+        <p:blipFill>
+          <a:blip r:embed="rId4"/>
+          <a:stretch>
+            <a:fillRect/>
+          </a:stretch>
+        </p:blipFill>
+        <p:spPr>
+          <a:xfrm>
+            <a:off x="5732338" y="1349297"/>
+            <a:ext cx="6071576" cy="4159405"/>
+          </a:xfrm>
+          <a:prstGeom prst="rect">
+            <a:avLst/>
+          </a:prstGeom>
+        </p:spPr>
+      </p:pic>
+      <p:pic>
+        <p:nvPicPr>
+          <p:cNvPr id="5" name="Audio 4">
+            <a:hlinkClick r:id="" action="ppaction://media"/>
+            <a:extLst>
+              <a:ext uri="{FF2B5EF4-FFF2-40B4-BE49-F238E27FC236}">
+                <a16:creationId xmlns:a16="http://schemas.microsoft.com/office/drawing/2014/main" id="{223CC34D-FF20-3547-A433-F7D0C7D4260B}"/>
+              </a:ext>
+            </a:extLst>
+          </p:cNvPr>
+          <p:cNvPicPr>
+            <a:picLocks noChangeAspect="1"/>
+          </p:cNvPicPr>
+          <p:nvPr>
+            <a:audioFile r:link="rId2"/>
+            <p:extLst>
+              <p:ext uri="{DAA4B4D4-6D71-4841-9C94-3DE7FCFB9230}">
+                <p14:media xmlns:p14="http://schemas.microsoft.com/office/powerpoint/2010/main" r:embed="rId1"/>
+              </p:ext>
+            </p:extLst>
+          </p:nvPr>
+        </p:nvPicPr>
+        <p:blipFill>
+          <a:blip r:embed="rId5"/>
+          <a:stretch>
+            <a:fillRect/>
+          </a:stretch>
+        </p:blipFill>
+        <p:spPr>
+          <a:xfrm>
+            <a:off x="11226800" y="5892800"/>
+            <a:ext cx="812800" cy="812800"/>
+          </a:xfrm>
+          <a:prstGeom prst="rect">
+            <a:avLst/>
+          </a:prstGeom>
+        </p:spPr>
+      </p:pic>
     </p:spTree>
     <p:extLst>
       <p:ext uri="{BB962C8B-B14F-4D97-AF65-F5344CB8AC3E}">
@@ -6581,6 +9400,101 @@
   <p:clrMapOvr>
     <a:masterClrMapping/>
   </p:clrMapOvr>
+  <mc:AlternateContent xmlns:mc="http://schemas.openxmlformats.org/markup-compatibility/2006">
+    <mc:Choice xmlns:p14="http://schemas.microsoft.com/office/powerpoint/2010/main" Requires="p14">
+      <p:transition spd="slow" p14:dur="2000" advTm="104314"/>
+    </mc:Choice>
+    <mc:Fallback>
+      <p:transition spd="slow" advTm="104314"/>
+    </mc:Fallback>
+  </mc:AlternateContent>
+  <p:timing>
+    <p:tnLst>
+      <p:par>
+        <p:cTn id="1" dur="indefinite" restart="never" nodeType="tmRoot">
+          <p:childTnLst>
+            <p:seq concurrent="1" nextAc="seek">
+              <p:cTn id="2" dur="indefinite" nodeType="mainSeq">
+                <p:childTnLst>
+                  <p:par>
+                    <p:cTn id="3" fill="hold">
+                      <p:stCondLst>
+                        <p:cond delay="indefinite"/>
+                        <p:cond evt="onBegin" delay="0">
+                          <p:tn val="2"/>
+                        </p:cond>
+                      </p:stCondLst>
+                      <p:childTnLst>
+                        <p:par>
+                          <p:cTn id="4" fill="hold">
+                            <p:stCondLst>
+                              <p:cond delay="0"/>
+                            </p:stCondLst>
+                            <p:childTnLst>
+                              <p:par>
+                                <p:cTn id="5" presetID="1" presetClass="mediacall" presetSubtype="0" fill="hold" nodeType="afterEffect">
+                                  <p:stCondLst>
+                                    <p:cond delay="0"/>
+                                  </p:stCondLst>
+                                  <p:childTnLst>
+                                    <p:cmd type="call" cmd="playFrom(0.0)">
+                                      <p:cBhvr>
+                                        <p:cTn id="6" dur="1" fill="hold"/>
+                                        <p:tgtEl>
+                                          <p:spTgt spid="5"/>
+                                        </p:tgtEl>
+                                      </p:cBhvr>
+                                    </p:cmd>
+                                  </p:childTnLst>
+                                </p:cTn>
+                              </p:par>
+                            </p:childTnLst>
+                          </p:cTn>
+                        </p:par>
+                      </p:childTnLst>
+                    </p:cTn>
+                  </p:par>
+                </p:childTnLst>
+              </p:cTn>
+              <p:prevCondLst>
+                <p:cond evt="onPrev" delay="0">
+                  <p:tgtEl>
+                    <p:sldTgt/>
+                  </p:tgtEl>
+                </p:cond>
+              </p:prevCondLst>
+              <p:nextCondLst>
+                <p:cond evt="onNext" delay="0">
+                  <p:tgtEl>
+                    <p:sldTgt/>
+                  </p:tgtEl>
+                </p:cond>
+              </p:nextCondLst>
+            </p:seq>
+            <p:audio isNarration="1">
+              <p:cMediaNode vol="80000" showWhenStopped="0">
+                <p:cTn id="7" fill="hold" display="0">
+                  <p:stCondLst>
+                    <p:cond delay="indefinite"/>
+                  </p:stCondLst>
+                  <p:endCondLst>
+                    <p:cond evt="onStopAudio" delay="0">
+                      <p:tgtEl>
+                        <p:sldTgt/>
+                      </p:tgtEl>
+                    </p:cond>
+                  </p:endCondLst>
+                </p:cTn>
+                <p:tgtEl>
+                  <p:spTgt spid="5"/>
+                </p:tgtEl>
+              </p:cMediaNode>
+            </p:audio>
+          </p:childTnLst>
+        </p:cTn>
+      </p:par>
+    </p:tnLst>
+  </p:timing>
 </p:sld>
 </file>
 
@@ -6839,4 +9753,528 @@
     </a:ext>
   </a:extLst>
 </a:theme>
+</file>
+
+<file path=ppt/theme/theme2.xml><?xml version="1.0" encoding="utf-8"?>
+<a:theme xmlns:a="http://schemas.openxmlformats.org/drawingml/2006/main" name="Office Theme">
+  <a:themeElements>
+    <a:clrScheme name="Office">
+      <a:dk1>
+        <a:sysClr val="windowText" lastClr="000000"/>
+      </a:dk1>
+      <a:lt1>
+        <a:sysClr val="window" lastClr="FFFFFF"/>
+      </a:lt1>
+      <a:dk2>
+        <a:srgbClr val="44546A"/>
+      </a:dk2>
+      <a:lt2>
+        <a:srgbClr val="E7E6E6"/>
+      </a:lt2>
+      <a:accent1>
+        <a:srgbClr val="4472C4"/>
+      </a:accent1>
+      <a:accent2>
+        <a:srgbClr val="ED7D31"/>
+      </a:accent2>
+      <a:accent3>
+        <a:srgbClr val="A5A5A5"/>
+      </a:accent3>
+      <a:accent4>
+        <a:srgbClr val="FFC000"/>
+      </a:accent4>
+      <a:accent5>
+        <a:srgbClr val="5B9BD5"/>
+      </a:accent5>
+      <a:accent6>
+        <a:srgbClr val="70AD47"/>
+      </a:accent6>
+      <a:hlink>
+        <a:srgbClr val="0563C1"/>
+      </a:hlink>
+      <a:folHlink>
+        <a:srgbClr val="954F72"/>
+      </a:folHlink>
+    </a:clrScheme>
+    <a:fontScheme name="Office">
+      <a:majorFont>
+        <a:latin typeface="Calibri Light" panose="020F0302020204030204"/>
+        <a:ea typeface=""/>
+        <a:cs typeface=""/>
+        <a:font script="Jpan" typeface="游ゴシック Light"/>
+        <a:font script="Hang" typeface="맑은 고딕"/>
+        <a:font script="Hans" typeface="等线 Light"/>
+        <a:font script="Hant" typeface="新細明體"/>
+        <a:font script="Arab" typeface="Times New Roman"/>
+        <a:font script="Hebr" typeface="Times New Roman"/>
+        <a:font script="Thai" typeface="Angsana New"/>
+        <a:font script="Ethi" typeface="Nyala"/>
+        <a:font script="Beng" typeface="Vrinda"/>
+        <a:font script="Gujr" typeface="Shruti"/>
+        <a:font script="Khmr" typeface="MoolBoran"/>
+        <a:font script="Knda" typeface="Tunga"/>
+        <a:font script="Guru" typeface="Raavi"/>
+        <a:font script="Cans" typeface="Euphemia"/>
+        <a:font script="Cher" typeface="Plantagenet Cherokee"/>
+        <a:font script="Yiii" typeface="Microsoft Yi Baiti"/>
+        <a:font script="Tibt" typeface="Microsoft Himalaya"/>
+        <a:font script="Thaa" typeface="MV Boli"/>
+        <a:font script="Deva" typeface="Mangal"/>
+        <a:font script="Telu" typeface="Gautami"/>
+        <a:font script="Taml" typeface="Latha"/>
+        <a:font script="Syrc" typeface="Estrangelo Edessa"/>
+        <a:font script="Orya" typeface="Kalinga"/>
+        <a:font script="Mlym" typeface="Kartika"/>
+        <a:font script="Laoo" typeface="DokChampa"/>
+        <a:font script="Sinh" typeface="Iskoola Pota"/>
+        <a:font script="Mong" typeface="Mongolian Baiti"/>
+        <a:font script="Viet" typeface="Times New Roman"/>
+        <a:font script="Uigh" typeface="Microsoft Uighur"/>
+        <a:font script="Geor" typeface="Sylfaen"/>
+        <a:font script="Armn" typeface="Arial"/>
+        <a:font script="Bugi" typeface="Leelawadee UI"/>
+        <a:font script="Bopo" typeface="Microsoft JhengHei"/>
+        <a:font script="Java" typeface="Javanese Text"/>
+        <a:font script="Lisu" typeface="Segoe UI"/>
+        <a:font script="Mymr" typeface="Myanmar Text"/>
+        <a:font script="Nkoo" typeface="Ebrima"/>
+        <a:font script="Olck" typeface="Nirmala UI"/>
+        <a:font script="Osma" typeface="Ebrima"/>
+        <a:font script="Phag" typeface="Phagspa"/>
+        <a:font script="Syrn" typeface="Estrangelo Edessa"/>
+        <a:font script="Syrj" typeface="Estrangelo Edessa"/>
+        <a:font script="Syre" typeface="Estrangelo Edessa"/>
+        <a:font script="Sora" typeface="Nirmala UI"/>
+        <a:font script="Tale" typeface="Microsoft Tai Le"/>
+        <a:font script="Talu" typeface="Microsoft New Tai Lue"/>
+        <a:font script="Tfng" typeface="Ebrima"/>
+      </a:majorFont>
+      <a:minorFont>
+        <a:latin typeface="Calibri" panose="020F0502020204030204"/>
+        <a:ea typeface=""/>
+        <a:cs typeface=""/>
+        <a:font script="Jpan" typeface="游ゴシック"/>
+        <a:font script="Hang" typeface="맑은 고딕"/>
+        <a:font script="Hans" typeface="等线"/>
+        <a:font script="Hant" typeface="新細明體"/>
+        <a:font script="Arab" typeface="Arial"/>
+        <a:font script="Hebr" typeface="Arial"/>
+        <a:font script="Thai" typeface="Cordia New"/>
+        <a:font script="Ethi" typeface="Nyala"/>
+        <a:font script="Beng" typeface="Vrinda"/>
+        <a:font script="Gujr" typeface="Shruti"/>
+        <a:font script="Khmr" typeface="DaunPenh"/>
+        <a:font script="Knda" typeface="Tunga"/>
+        <a:font script="Guru" typeface="Raavi"/>
+        <a:font script="Cans" typeface="Euphemia"/>
+        <a:font script="Cher" typeface="Plantagenet Cherokee"/>
+        <a:font script="Yiii" typeface="Microsoft Yi Baiti"/>
+        <a:font script="Tibt" typeface="Microsoft Himalaya"/>
+        <a:font script="Thaa" typeface="MV Boli"/>
+        <a:font script="Deva" typeface="Mangal"/>
+        <a:font script="Telu" typeface="Gautami"/>
+        <a:font script="Taml" typeface="Latha"/>
+        <a:font script="Syrc" typeface="Estrangelo Edessa"/>
+        <a:font script="Orya" typeface="Kalinga"/>
+        <a:font script="Mlym" typeface="Kartika"/>
+        <a:font script="Laoo" typeface="DokChampa"/>
+        <a:font script="Sinh" typeface="Iskoola Pota"/>
+        <a:font script="Mong" typeface="Mongolian Baiti"/>
+        <a:font script="Viet" typeface="Arial"/>
+        <a:font script="Uigh" typeface="Microsoft Uighur"/>
+        <a:font script="Geor" typeface="Sylfaen"/>
+        <a:font script="Armn" typeface="Arial"/>
+        <a:font script="Bugi" typeface="Leelawadee UI"/>
+        <a:font script="Bopo" typeface="Microsoft JhengHei"/>
+        <a:font script="Java" typeface="Javanese Text"/>
+        <a:font script="Lisu" typeface="Segoe UI"/>
+        <a:font script="Mymr" typeface="Myanmar Text"/>
+        <a:font script="Nkoo" typeface="Ebrima"/>
+        <a:font script="Olck" typeface="Nirmala UI"/>
+        <a:font script="Osma" typeface="Ebrima"/>
+        <a:font script="Phag" typeface="Phagspa"/>
+        <a:font script="Syrn" typeface="Estrangelo Edessa"/>
+        <a:font script="Syrj" typeface="Estrangelo Edessa"/>
+        <a:font script="Syre" typeface="Estrangelo Edessa"/>
+        <a:font script="Sora" typeface="Nirmala UI"/>
+        <a:font script="Tale" typeface="Microsoft Tai Le"/>
+        <a:font script="Talu" typeface="Microsoft New Tai Lue"/>
+        <a:font script="Tfng" typeface="Ebrima"/>
+      </a:minorFont>
+    </a:fontScheme>
+    <a:fmtScheme name="Office">
+      <a:fillStyleLst>
+        <a:solidFill>
+          <a:schemeClr val="phClr"/>
+        </a:solidFill>
+        <a:gradFill rotWithShape="1">
+          <a:gsLst>
+            <a:gs pos="0">
+              <a:schemeClr val="phClr">
+                <a:lumMod val="110000"/>
+                <a:satMod val="105000"/>
+                <a:tint val="67000"/>
+              </a:schemeClr>
+            </a:gs>
+            <a:gs pos="50000">
+              <a:schemeClr val="phClr">
+                <a:lumMod val="105000"/>
+                <a:satMod val="103000"/>
+                <a:tint val="73000"/>
+              </a:schemeClr>
+            </a:gs>
+            <a:gs pos="100000">
+              <a:schemeClr val="phClr">
+                <a:lumMod val="105000"/>
+                <a:satMod val="109000"/>
+                <a:tint val="81000"/>
+              </a:schemeClr>
+            </a:gs>
+          </a:gsLst>
+          <a:lin ang="5400000" scaled="0"/>
+        </a:gradFill>
+        <a:gradFill rotWithShape="1">
+          <a:gsLst>
+            <a:gs pos="0">
+              <a:schemeClr val="phClr">
+                <a:satMod val="103000"/>
+                <a:lumMod val="102000"/>
+                <a:tint val="94000"/>
+              </a:schemeClr>
+            </a:gs>
+            <a:gs pos="50000">
+              <a:schemeClr val="phClr">
+                <a:satMod val="110000"/>
+                <a:lumMod val="100000"/>
+                <a:shade val="100000"/>
+              </a:schemeClr>
+            </a:gs>
+            <a:gs pos="100000">
+              <a:schemeClr val="phClr">
+                <a:lumMod val="99000"/>
+                <a:satMod val="120000"/>
+                <a:shade val="78000"/>
+              </a:schemeClr>
+            </a:gs>
+          </a:gsLst>
+          <a:lin ang="5400000" scaled="0"/>
+        </a:gradFill>
+      </a:fillStyleLst>
+      <a:lnStyleLst>
+        <a:ln w="6350" cap="flat" cmpd="sng" algn="ctr">
+          <a:solidFill>
+            <a:schemeClr val="phClr"/>
+          </a:solidFill>
+          <a:prstDash val="solid"/>
+          <a:miter lim="800000"/>
+        </a:ln>
+        <a:ln w="12700" cap="flat" cmpd="sng" algn="ctr">
+          <a:solidFill>
+            <a:schemeClr val="phClr"/>
+          </a:solidFill>
+          <a:prstDash val="solid"/>
+          <a:miter lim="800000"/>
+        </a:ln>
+        <a:ln w="19050" cap="flat" cmpd="sng" algn="ctr">
+          <a:solidFill>
+            <a:schemeClr val="phClr"/>
+          </a:solidFill>
+          <a:prstDash val="solid"/>
+          <a:miter lim="800000"/>
+        </a:ln>
+      </a:lnStyleLst>
+      <a:effectStyleLst>
+        <a:effectStyle>
+          <a:effectLst/>
+        </a:effectStyle>
+        <a:effectStyle>
+          <a:effectLst/>
+        </a:effectStyle>
+        <a:effectStyle>
+          <a:effectLst>
+            <a:outerShdw blurRad="57150" dist="19050" dir="5400000" algn="ctr" rotWithShape="0">
+              <a:srgbClr val="000000">
+                <a:alpha val="63000"/>
+              </a:srgbClr>
+            </a:outerShdw>
+          </a:effectLst>
+        </a:effectStyle>
+      </a:effectStyleLst>
+      <a:bgFillStyleLst>
+        <a:solidFill>
+          <a:schemeClr val="phClr"/>
+        </a:solidFill>
+        <a:solidFill>
+          <a:schemeClr val="phClr">
+            <a:tint val="95000"/>
+            <a:satMod val="170000"/>
+          </a:schemeClr>
+        </a:solidFill>
+        <a:gradFill rotWithShape="1">
+          <a:gsLst>
+            <a:gs pos="0">
+              <a:schemeClr val="phClr">
+                <a:tint val="93000"/>
+                <a:satMod val="150000"/>
+                <a:shade val="98000"/>
+                <a:lumMod val="102000"/>
+              </a:schemeClr>
+            </a:gs>
+            <a:gs pos="50000">
+              <a:schemeClr val="phClr">
+                <a:tint val="98000"/>
+                <a:satMod val="130000"/>
+                <a:shade val="90000"/>
+                <a:lumMod val="103000"/>
+              </a:schemeClr>
+            </a:gs>
+            <a:gs pos="100000">
+              <a:schemeClr val="phClr">
+                <a:shade val="63000"/>
+                <a:satMod val="120000"/>
+              </a:schemeClr>
+            </a:gs>
+          </a:gsLst>
+          <a:lin ang="5400000" scaled="0"/>
+        </a:gradFill>
+      </a:bgFillStyleLst>
+    </a:fmtScheme>
+  </a:themeElements>
+  <a:objectDefaults/>
+  <a:extraClrSchemeLst/>
+  <a:extLst>
+    <a:ext uri="{05A4C25C-085E-4340-85A3-A5531E510DB2}">
+      <thm15:themeFamily xmlns:thm15="http://schemas.microsoft.com/office/thememl/2012/main" name="Office Theme" id="{62F939B6-93AF-4DB8-9C6B-D6C7DFDC589F}" vid="{4A3C46E8-61CC-4603-A589-7422A47A8E4A}"/>
+    </a:ext>
+  </a:extLst>
+</a:theme>
+</file>
+
+<file path=customXml/item1.xml><?xml version="1.0" encoding="utf-8"?>
+<?mso-contentType ?>
+<FormTemplates xmlns="http://schemas.microsoft.com/sharepoint/v3/contenttype/forms">
+  <Display>DocumentLibraryForm</Display>
+  <Edit>DocumentLibraryForm</Edit>
+  <New>DocumentLibraryForm</New>
+</FormTemplates>
+</file>
+
+<file path=customXml/item2.xml><?xml version="1.0" encoding="utf-8"?>
+<ct:contentTypeSchema xmlns:ct="http://schemas.microsoft.com/office/2006/metadata/contentType" xmlns:ma="http://schemas.microsoft.com/office/2006/metadata/properties/metaAttributes" ct:_="" ma:_="" ma:contentTypeName="Document" ma:contentTypeID="0x01010006C9BF366C24BD43A2E53C4E4C4D3DED" ma:contentTypeVersion="8" ma:contentTypeDescription="Create a new document." ma:contentTypeScope="" ma:versionID="b3aaed1441fa9ec8868dd3669ee933cd">
+  <xsd:schema xmlns:xsd="http://www.w3.org/2001/XMLSchema" xmlns:xs="http://www.w3.org/2001/XMLSchema" xmlns:p="http://schemas.microsoft.com/office/2006/metadata/properties" xmlns:ns2="268d9291-229d-48ff-988a-ac4e6f5458d2" targetNamespace="http://schemas.microsoft.com/office/2006/metadata/properties" ma:root="true" ma:fieldsID="7821ed01cc0f4070f78c3bf7396316ff" ns2:_="">
+    <xsd:import namespace="268d9291-229d-48ff-988a-ac4e6f5458d2"/>
+    <xsd:element name="properties">
+      <xsd:complexType>
+        <xsd:sequence>
+          <xsd:element name="documentManagement">
+            <xsd:complexType>
+              <xsd:all>
+                <xsd:element ref="ns2:MediaServiceMetadata" minOccurs="0"/>
+                <xsd:element ref="ns2:MediaServiceFastMetadata" minOccurs="0"/>
+                <xsd:element ref="ns2:MediaServiceAutoKeyPoints" minOccurs="0"/>
+                <xsd:element ref="ns2:MediaServiceKeyPoints" minOccurs="0"/>
+                <xsd:element ref="ns2:MediaServiceAutoTags" minOccurs="0"/>
+                <xsd:element ref="ns2:MediaServiceOCR" minOccurs="0"/>
+                <xsd:element ref="ns2:MediaServiceGenerationTime" minOccurs="0"/>
+                <xsd:element ref="ns2:MediaServiceEventHashCode" minOccurs="0"/>
+              </xsd:all>
+            </xsd:complexType>
+          </xsd:element>
+        </xsd:sequence>
+      </xsd:complexType>
+    </xsd:element>
+  </xsd:schema>
+  <xsd:schema xmlns:xsd="http://www.w3.org/2001/XMLSchema" xmlns:xs="http://www.w3.org/2001/XMLSchema" xmlns:dms="http://schemas.microsoft.com/office/2006/documentManagement/types" xmlns:pc="http://schemas.microsoft.com/office/infopath/2007/PartnerControls" targetNamespace="268d9291-229d-48ff-988a-ac4e6f5458d2" elementFormDefault="qualified">
+    <xsd:import namespace="http://schemas.microsoft.com/office/2006/documentManagement/types"/>
+    <xsd:import namespace="http://schemas.microsoft.com/office/infopath/2007/PartnerControls"/>
+    <xsd:element name="MediaServiceMetadata" ma:index="8" nillable="true" ma:displayName="MediaServiceMetadata" ma:hidden="true" ma:internalName="MediaServiceMetadata" ma:readOnly="true">
+      <xsd:simpleType>
+        <xsd:restriction base="dms:Note"/>
+      </xsd:simpleType>
+    </xsd:element>
+    <xsd:element name="MediaServiceFastMetadata" ma:index="9" nillable="true" ma:displayName="MediaServiceFastMetadata" ma:hidden="true" ma:internalName="MediaServiceFastMetadata" ma:readOnly="true">
+      <xsd:simpleType>
+        <xsd:restriction base="dms:Note"/>
+      </xsd:simpleType>
+    </xsd:element>
+    <xsd:element name="MediaServiceAutoKeyPoints" ma:index="10" nillable="true" ma:displayName="MediaServiceAutoKeyPoints" ma:hidden="true" ma:internalName="MediaServiceAutoKeyPoints" ma:readOnly="true">
+      <xsd:simpleType>
+        <xsd:restriction base="dms:Note"/>
+      </xsd:simpleType>
+    </xsd:element>
+    <xsd:element name="MediaServiceKeyPoints" ma:index="11" nillable="true" ma:displayName="KeyPoints" ma:internalName="MediaServiceKeyPoints" ma:readOnly="true">
+      <xsd:simpleType>
+        <xsd:restriction base="dms:Note">
+          <xsd:maxLength value="255"/>
+        </xsd:restriction>
+      </xsd:simpleType>
+    </xsd:element>
+    <xsd:element name="MediaServiceAutoTags" ma:index="12" nillable="true" ma:displayName="Tags" ma:internalName="MediaServiceAutoTags" ma:readOnly="true">
+      <xsd:simpleType>
+        <xsd:restriction base="dms:Text"/>
+      </xsd:simpleType>
+    </xsd:element>
+    <xsd:element name="MediaServiceOCR" ma:index="13" nillable="true" ma:displayName="Extracted Text" ma:internalName="MediaServiceOCR" ma:readOnly="true">
+      <xsd:simpleType>
+        <xsd:restriction base="dms:Note">
+          <xsd:maxLength value="255"/>
+        </xsd:restriction>
+      </xsd:simpleType>
+    </xsd:element>
+    <xsd:element name="MediaServiceGenerationTime" ma:index="14" nillable="true" ma:displayName="MediaServiceGenerationTime" ma:hidden="true" ma:internalName="MediaServiceGenerationTime" ma:readOnly="true">
+      <xsd:simpleType>
+        <xsd:restriction base="dms:Text"/>
+      </xsd:simpleType>
+    </xsd:element>
+    <xsd:element name="MediaServiceEventHashCode" ma:index="15" nillable="true" ma:displayName="MediaServiceEventHashCode" ma:hidden="true" ma:internalName="MediaServiceEventHashCode" ma:readOnly="true">
+      <xsd:simpleType>
+        <xsd:restriction base="dms:Text"/>
+      </xsd:simpleType>
+    </xsd:element>
+  </xsd:schema>
+  <xsd:schema xmlns="http://schemas.openxmlformats.org/package/2006/metadata/core-properties" xmlns:xsd="http://www.w3.org/2001/XMLSchema" xmlns:xsi="http://www.w3.org/2001/XMLSchema-instance" xmlns:dc="http://purl.org/dc/elements/1.1/" xmlns:dcterms="http://purl.org/dc/terms/" xmlns:odoc="http://schemas.microsoft.com/internal/obd" targetNamespace="http://schemas.openxmlformats.org/package/2006/metadata/core-properties" elementFormDefault="qualified" attributeFormDefault="unqualified" blockDefault="#all">
+    <xsd:import namespace="http://purl.org/dc/elements/1.1/" schemaLocation="http://dublincore.org/schemas/xmls/qdc/2003/04/02/dc.xsd"/>
+    <xsd:import namespace="http://purl.org/dc/terms/" schemaLocation="http://dublincore.org/schemas/xmls/qdc/2003/04/02/dcterms.xsd"/>
+    <xsd:element name="coreProperties" type="CT_coreProperties"/>
+    <xsd:complexType name="CT_coreProperties">
+      <xsd:all>
+        <xsd:element ref="dc:creator" minOccurs="0" maxOccurs="1"/>
+        <xsd:element ref="dcterms:created" minOccurs="0" maxOccurs="1"/>
+        <xsd:element ref="dc:identifier" minOccurs="0" maxOccurs="1"/>
+        <xsd:element name="contentType" minOccurs="0" maxOccurs="1" type="xsd:string" ma:index="0" ma:displayName="Content Type"/>
+        <xsd:element ref="dc:title" minOccurs="0" maxOccurs="1" ma:index="4" ma:displayName="Title"/>
+        <xsd:element ref="dc:subject" minOccurs="0" maxOccurs="1"/>
+        <xsd:element ref="dc:description" minOccurs="0" maxOccurs="1"/>
+        <xsd:element name="keywords" minOccurs="0" maxOccurs="1" type="xsd:string"/>
+        <xsd:element ref="dc:language" minOccurs="0" maxOccurs="1"/>
+        <xsd:element name="category" minOccurs="0" maxOccurs="1" type="xsd:string"/>
+        <xsd:element name="version" minOccurs="0" maxOccurs="1" type="xsd:string"/>
+        <xsd:element name="revision" minOccurs="0" maxOccurs="1" type="xsd:string">
+          <xsd:annotation>
+            <xsd:documentation>
+                        This value indicates the number of saves or revisions. The application is responsible for updating this value after each revision.
+                    </xsd:documentation>
+          </xsd:annotation>
+        </xsd:element>
+        <xsd:element name="lastModifiedBy" minOccurs="0" maxOccurs="1" type="xsd:string"/>
+        <xsd:element ref="dcterms:modified" minOccurs="0" maxOccurs="1"/>
+        <xsd:element name="contentStatus" minOccurs="0" maxOccurs="1" type="xsd:string"/>
+      </xsd:all>
+    </xsd:complexType>
+  </xsd:schema>
+  <xs:schema xmlns:pc="http://schemas.microsoft.com/office/infopath/2007/PartnerControls" xmlns:xs="http://www.w3.org/2001/XMLSchema" targetNamespace="http://schemas.microsoft.com/office/infopath/2007/PartnerControls" elementFormDefault="qualified" attributeFormDefault="unqualified">
+    <xs:element name="Person">
+      <xs:complexType>
+        <xs:sequence>
+          <xs:element ref="pc:DisplayName" minOccurs="0"/>
+          <xs:element ref="pc:AccountId" minOccurs="0"/>
+          <xs:element ref="pc:AccountType" minOccurs="0"/>
+        </xs:sequence>
+      </xs:complexType>
+    </xs:element>
+    <xs:element name="DisplayName" type="xs:string"/>
+    <xs:element name="AccountId" type="xs:string"/>
+    <xs:element name="AccountType" type="xs:string"/>
+    <xs:element name="BDCAssociatedEntity">
+      <xs:complexType>
+        <xs:sequence>
+          <xs:element ref="pc:BDCEntity" minOccurs="0" maxOccurs="unbounded"/>
+        </xs:sequence>
+        <xs:attribute ref="pc:EntityNamespace"/>
+        <xs:attribute ref="pc:EntityName"/>
+        <xs:attribute ref="pc:SystemInstanceName"/>
+        <xs:attribute ref="pc:AssociationName"/>
+      </xs:complexType>
+    </xs:element>
+    <xs:attribute name="EntityNamespace" type="xs:string"/>
+    <xs:attribute name="EntityName" type="xs:string"/>
+    <xs:attribute name="SystemInstanceName" type="xs:string"/>
+    <xs:attribute name="AssociationName" type="xs:string"/>
+    <xs:element name="BDCEntity">
+      <xs:complexType>
+        <xs:sequence>
+          <xs:element ref="pc:EntityDisplayName" minOccurs="0"/>
+          <xs:element ref="pc:EntityInstanceReference" minOccurs="0"/>
+          <xs:element ref="pc:EntityId1" minOccurs="0"/>
+          <xs:element ref="pc:EntityId2" minOccurs="0"/>
+          <xs:element ref="pc:EntityId3" minOccurs="0"/>
+          <xs:element ref="pc:EntityId4" minOccurs="0"/>
+          <xs:element ref="pc:EntityId5" minOccurs="0"/>
+        </xs:sequence>
+      </xs:complexType>
+    </xs:element>
+    <xs:element name="EntityDisplayName" type="xs:string"/>
+    <xs:element name="EntityInstanceReference" type="xs:string"/>
+    <xs:element name="EntityId1" type="xs:string"/>
+    <xs:element name="EntityId2" type="xs:string"/>
+    <xs:element name="EntityId3" type="xs:string"/>
+    <xs:element name="EntityId4" type="xs:string"/>
+    <xs:element name="EntityId5" type="xs:string"/>
+    <xs:element name="Terms">
+      <xs:complexType>
+        <xs:sequence>
+          <xs:element ref="pc:TermInfo" minOccurs="0" maxOccurs="unbounded"/>
+        </xs:sequence>
+      </xs:complexType>
+    </xs:element>
+    <xs:element name="TermInfo">
+      <xs:complexType>
+        <xs:sequence>
+          <xs:element ref="pc:TermName" minOccurs="0"/>
+          <xs:element ref="pc:TermId" minOccurs="0"/>
+        </xs:sequence>
+      </xs:complexType>
+    </xs:element>
+    <xs:element name="TermName" type="xs:string"/>
+    <xs:element name="TermId" type="xs:string"/>
+  </xs:schema>
+</ct:contentTypeSchema>
+</file>
+
+<file path=customXml/item3.xml><?xml version="1.0" encoding="utf-8"?>
+<p:properties xmlns:p="http://schemas.microsoft.com/office/2006/metadata/properties" xmlns:xsi="http://www.w3.org/2001/XMLSchema-instance" xmlns:pc="http://schemas.microsoft.com/office/infopath/2007/PartnerControls">
+  <documentManagement/>
+</p:properties>
+</file>
+
+<file path=customXml/itemProps1.xml><?xml version="1.0" encoding="utf-8"?>
+<ds:datastoreItem xmlns:ds="http://schemas.openxmlformats.org/officeDocument/2006/customXml" ds:itemID="{38C4741B-9BD8-41F0-9C99-26732CB7DF19}">
+  <ds:schemaRefs>
+    <ds:schemaRef ds:uri="http://schemas.microsoft.com/sharepoint/v3/contenttype/forms"/>
+  </ds:schemaRefs>
+</ds:datastoreItem>
+</file>
+
+<file path=customXml/itemProps2.xml><?xml version="1.0" encoding="utf-8"?>
+<ds:datastoreItem xmlns:ds="http://schemas.openxmlformats.org/officeDocument/2006/customXml" ds:itemID="{DBDD0522-23DD-4911-B9BD-B96FC44AE1B1}">
+  <ds:schemaRefs>
+    <ds:schemaRef ds:uri="http://schemas.microsoft.com/office/2006/metadata/contentType"/>
+    <ds:schemaRef ds:uri="http://schemas.microsoft.com/office/2006/metadata/properties/metaAttributes"/>
+    <ds:schemaRef ds:uri="http://www.w3.org/2001/XMLSchema"/>
+    <ds:schemaRef ds:uri="http://schemas.microsoft.com/office/2006/metadata/properties"/>
+    <ds:schemaRef ds:uri="268d9291-229d-48ff-988a-ac4e6f5458d2"/>
+    <ds:schemaRef ds:uri="http://schemas.microsoft.com/office/2006/documentManagement/types"/>
+    <ds:schemaRef ds:uri="http://schemas.microsoft.com/office/infopath/2007/PartnerControls"/>
+    <ds:schemaRef ds:uri="http://schemas.openxmlformats.org/package/2006/metadata/core-properties"/>
+    <ds:schemaRef ds:uri="http://purl.org/dc/elements/1.1/"/>
+    <ds:schemaRef ds:uri="http://purl.org/dc/terms/"/>
+    <ds:schemaRef ds:uri="http://schemas.microsoft.com/internal/obd"/>
+  </ds:schemaRefs>
+</ds:datastoreItem>
+</file>
+
+<file path=customXml/itemProps3.xml><?xml version="1.0" encoding="utf-8"?>
+<ds:datastoreItem xmlns:ds="http://schemas.openxmlformats.org/officeDocument/2006/customXml" ds:itemID="{BA7C5CBE-3000-4C5E-A3EC-FAB0E7C25D97}">
+  <ds:schemaRefs>
+    <ds:schemaRef ds:uri="http://schemas.microsoft.com/office/2006/metadata/properties"/>
+    <ds:schemaRef ds:uri="http://www.w3.org/XML/1998/namespace"/>
+    <ds:schemaRef ds:uri="http://purl.org/dc/terms/"/>
+    <ds:schemaRef ds:uri="http://purl.org/dc/elements/1.1/"/>
+    <ds:schemaRef ds:uri="http://schemas.microsoft.com/office/2006/documentManagement/types"/>
+    <ds:schemaRef ds:uri="http://schemas.openxmlformats.org/package/2006/metadata/core-properties"/>
+    <ds:schemaRef ds:uri="http://schemas.microsoft.com/office/infopath/2007/PartnerControls"/>
+    <ds:schemaRef ds:uri="268d9291-229d-48ff-988a-ac4e6f5458d2"/>
+    <ds:schemaRef ds:uri="http://purl.org/dc/dcmitype/"/>
+  </ds:schemaRefs>
+</ds:datastoreItem>
 </file>
</xml_diff>